<commit_message>
minor tweaks to the presentation
</commit_message>
<xml_diff>
--- a/SOLID Principles - Step By Step Code/SOLID Principles Presentation.pptx
+++ b/SOLID Principles - Step By Step Code/SOLID Principles Presentation.pptx
@@ -282,7 +282,7 @@
               <a:pPr>
                 <a:defRPr/>
               </a:pPr>
-              <a:t>5/28/2009</a:t>
+              <a:t>6/3/2009</a:t>
             </a:fld>
             <a:endParaRPr lang="en-US"/>
           </a:p>
@@ -460,7 +460,7 @@
               <a:pPr>
                 <a:defRPr/>
               </a:pPr>
-              <a:t>5/28/2009</a:t>
+              <a:t>6/3/2009</a:t>
             </a:fld>
             <a:endParaRPr lang="en-US"/>
           </a:p>
@@ -4784,252 +4784,136 @@
       </p:sp>
       <p:grpSp>
         <p:nvGrpSpPr>
-          <p:cNvPr id="12" name="Group 11"/>
+          <p:cNvPr id="7" name="Group 6"/>
           <p:cNvGrpSpPr/>
           <p:nvPr/>
         </p:nvGrpSpPr>
         <p:grpSpPr>
           <a:xfrm>
-            <a:off x="2628900" y="3495675"/>
-            <a:ext cx="3581400" cy="2295525"/>
-            <a:chOff x="2628900" y="3276600"/>
-            <a:chExt cx="3581400" cy="2295525"/>
+            <a:off x="2933700" y="4114800"/>
+            <a:ext cx="3276600" cy="914400"/>
+            <a:chOff x="762000" y="3733800"/>
+            <a:chExt cx="3276600" cy="914400"/>
           </a:xfrm>
         </p:grpSpPr>
-        <p:grpSp>
-          <p:nvGrpSpPr>
-            <p:cNvPr id="7" name="Group 6"/>
-            <p:cNvGrpSpPr/>
-            <p:nvPr/>
-          </p:nvGrpSpPr>
-          <p:grpSpPr>
+        <p:sp>
+          <p:nvSpPr>
+            <p:cNvPr id="4" name="Rectangle 3"/>
+            <p:cNvSpPr/>
+            <p:nvPr/>
+          </p:nvSpPr>
+          <p:spPr>
             <a:xfrm>
-              <a:off x="2933700" y="3276600"/>
-              <a:ext cx="3276600" cy="914400"/>
-              <a:chOff x="762000" y="3733800"/>
-              <a:chExt cx="3276600" cy="914400"/>
-            </a:xfrm>
-          </p:grpSpPr>
-          <p:sp>
-            <p:nvSpPr>
-              <p:cNvPr id="4" name="Rectangle 3"/>
-              <p:cNvSpPr/>
-              <p:nvPr/>
-            </p:nvSpPr>
-            <p:spPr>
-              <a:xfrm>
-                <a:off x="762000" y="3733800"/>
-                <a:ext cx="914400" cy="914400"/>
-              </a:xfrm>
-              <a:prstGeom prst="rect">
-                <a:avLst/>
-              </a:prstGeom>
-            </p:spPr>
-            <p:style>
-              <a:lnRef idx="1">
-                <a:schemeClr val="accent2"/>
-              </a:lnRef>
-              <a:fillRef idx="3">
-                <a:schemeClr val="accent2"/>
-              </a:fillRef>
-              <a:effectRef idx="2">
-                <a:schemeClr val="accent2"/>
-              </a:effectRef>
-              <a:fontRef idx="minor">
-                <a:schemeClr val="lt1"/>
-              </a:fontRef>
-            </p:style>
-            <p:txBody>
-              <a:bodyPr rtlCol="0" anchor="ctr"/>
-              <a:lstStyle/>
-              <a:p>
-                <a:pPr algn="ctr"/>
-                <a:r>
-                  <a:rPr lang="en-US" dirty="0" smtClean="0"/>
-                  <a:t>Square</a:t>
-                </a:r>
-                <a:endParaRPr lang="en-US" dirty="0"/>
-              </a:p>
-            </p:txBody>
-          </p:sp>
-          <p:sp>
-            <p:nvSpPr>
-              <p:cNvPr id="5" name="Rectangle 4"/>
-              <p:cNvSpPr/>
-              <p:nvPr/>
-            </p:nvSpPr>
-            <p:spPr>
-              <a:xfrm>
-                <a:off x="2438400" y="3733800"/>
-                <a:ext cx="1600200" cy="914400"/>
-              </a:xfrm>
-              <a:prstGeom prst="rect">
-                <a:avLst/>
-              </a:prstGeom>
-            </p:spPr>
-            <p:style>
-              <a:lnRef idx="1">
-                <a:schemeClr val="accent1"/>
-              </a:lnRef>
-              <a:fillRef idx="3">
-                <a:schemeClr val="accent1"/>
-              </a:fillRef>
-              <a:effectRef idx="2">
-                <a:schemeClr val="accent1"/>
-              </a:effectRef>
-              <a:fontRef idx="minor">
-                <a:schemeClr val="lt1"/>
-              </a:fontRef>
-            </p:style>
-            <p:txBody>
-              <a:bodyPr rtlCol="0" anchor="ctr"/>
-              <a:lstStyle/>
-              <a:p>
-                <a:pPr algn="ctr"/>
-                <a:r>
-                  <a:rPr lang="en-US" dirty="0" smtClean="0"/>
-                  <a:t>Rectangle</a:t>
-                </a:r>
-                <a:endParaRPr lang="en-US" dirty="0"/>
-              </a:p>
-            </p:txBody>
-          </p:sp>
-          <p:sp>
-            <p:nvSpPr>
-              <p:cNvPr id="6" name="TextBox 5"/>
-              <p:cNvSpPr txBox="1"/>
-              <p:nvPr/>
-            </p:nvSpPr>
-            <p:spPr>
-              <a:xfrm>
-                <a:off x="1752600" y="3810000"/>
-                <a:ext cx="606256" cy="707886"/>
-              </a:xfrm>
-              <a:prstGeom prst="rect">
-                <a:avLst/>
-              </a:prstGeom>
-              <a:noFill/>
-            </p:spPr>
-            <p:txBody>
-              <a:bodyPr wrap="none" rtlCol="0">
-                <a:spAutoFit/>
-              </a:bodyPr>
-              <a:lstStyle/>
-              <a:p>
-                <a:r>
-                  <a:rPr lang="en-US" sz="4000" dirty="0" smtClean="0">
-                    <a:solidFill>
-                      <a:schemeClr val="accent1"/>
-                    </a:solidFill>
-                    <a:latin typeface="+mn-lt"/>
-                  </a:rPr>
-                  <a:t>!=</a:t>
-                </a:r>
-              </a:p>
-            </p:txBody>
-          </p:sp>
-        </p:grpSp>
-        <p:grpSp>
-          <p:nvGrpSpPr>
-            <p:cNvPr id="11" name="Group 10"/>
-            <p:cNvGrpSpPr/>
-            <p:nvPr/>
-          </p:nvGrpSpPr>
-          <p:grpSpPr>
+              <a:off x="762000" y="3733800"/>
+              <a:ext cx="914400" cy="914400"/>
+            </a:xfrm>
+            <a:prstGeom prst="rect">
+              <a:avLst/>
+            </a:prstGeom>
+          </p:spPr>
+          <p:style>
+            <a:lnRef idx="1">
+              <a:schemeClr val="accent2"/>
+            </a:lnRef>
+            <a:fillRef idx="3">
+              <a:schemeClr val="accent2"/>
+            </a:fillRef>
+            <a:effectRef idx="2">
+              <a:schemeClr val="accent2"/>
+            </a:effectRef>
+            <a:fontRef idx="minor">
+              <a:schemeClr val="lt1"/>
+            </a:fontRef>
+          </p:style>
+          <p:txBody>
+            <a:bodyPr rtlCol="0" anchor="ctr"/>
+            <a:lstStyle/>
+            <a:p>
+              <a:pPr algn="ctr"/>
+              <a:r>
+                <a:rPr lang="en-US" dirty="0" smtClean="0"/>
+                <a:t>Square</a:t>
+              </a:r>
+              <a:endParaRPr lang="en-US" dirty="0"/>
+            </a:p>
+          </p:txBody>
+        </p:sp>
+        <p:sp>
+          <p:nvSpPr>
+            <p:cNvPr id="5" name="Rectangle 4"/>
+            <p:cNvSpPr/>
+            <p:nvPr/>
+          </p:nvSpPr>
+          <p:spPr>
             <a:xfrm>
-              <a:off x="2628900" y="4495800"/>
-              <a:ext cx="3467100" cy="1076325"/>
-              <a:chOff x="2590800" y="4495800"/>
-              <a:chExt cx="3467100" cy="1076325"/>
-            </a:xfrm>
-          </p:grpSpPr>
-          <p:pic>
-            <p:nvPicPr>
-              <p:cNvPr id="1026" name="Picture 2" descr="C:\Documents and Settings\derickb\Desktop\images2.jpg"/>
-              <p:cNvPicPr>
-                <a:picLocks noChangeAspect="1" noChangeArrowheads="1"/>
-              </p:cNvPicPr>
-              <p:nvPr/>
-            </p:nvPicPr>
-            <p:blipFill>
-              <a:blip r:embed="rId2"/>
-              <a:srcRect/>
-              <a:stretch>
-                <a:fillRect/>
-              </a:stretch>
-            </p:blipFill>
-            <p:spPr bwMode="auto">
-              <a:xfrm>
-                <a:off x="4724400" y="4572000"/>
-                <a:ext cx="1333500" cy="1000125"/>
-              </a:xfrm>
-              <a:prstGeom prst="rect">
-                <a:avLst/>
-              </a:prstGeom>
-              <a:noFill/>
-            </p:spPr>
-          </p:pic>
-          <p:pic>
-            <p:nvPicPr>
-              <p:cNvPr id="1027" name="Picture 3" descr="C:\Documents and Settings\derickb\Desktop\images.jpg"/>
-              <p:cNvPicPr>
-                <a:picLocks noChangeAspect="1" noChangeArrowheads="1"/>
-              </p:cNvPicPr>
-              <p:nvPr/>
-            </p:nvPicPr>
-            <p:blipFill>
-              <a:blip r:embed="rId3"/>
-              <a:srcRect/>
-              <a:stretch>
-                <a:fillRect/>
-              </a:stretch>
-            </p:blipFill>
-            <p:spPr bwMode="auto">
-              <a:xfrm>
-                <a:off x="2590800" y="4495800"/>
-                <a:ext cx="1428750" cy="1076325"/>
-              </a:xfrm>
-              <a:prstGeom prst="rect">
-                <a:avLst/>
-              </a:prstGeom>
-              <a:noFill/>
-            </p:spPr>
-          </p:pic>
-          <p:sp>
-            <p:nvSpPr>
-              <p:cNvPr id="10" name="TextBox 9"/>
-              <p:cNvSpPr txBox="1"/>
-              <p:nvPr/>
-            </p:nvSpPr>
-            <p:spPr>
-              <a:xfrm>
-                <a:off x="3886200" y="4702314"/>
-                <a:ext cx="606256" cy="707886"/>
-              </a:xfrm>
-              <a:prstGeom prst="rect">
-                <a:avLst/>
-              </a:prstGeom>
-              <a:noFill/>
-            </p:spPr>
-            <p:txBody>
-              <a:bodyPr wrap="none" rtlCol="0">
-                <a:spAutoFit/>
-              </a:bodyPr>
-              <a:lstStyle/>
-              <a:p>
-                <a:r>
-                  <a:rPr lang="en-US" sz="4000" dirty="0" smtClean="0">
-                    <a:solidFill>
-                      <a:schemeClr val="accent1"/>
-                    </a:solidFill>
-                    <a:latin typeface="+mn-lt"/>
-                  </a:rPr>
-                  <a:t>!=</a:t>
-                </a:r>
-              </a:p>
-            </p:txBody>
-          </p:sp>
-        </p:grpSp>
+              <a:off x="2438400" y="3733800"/>
+              <a:ext cx="1600200" cy="914400"/>
+            </a:xfrm>
+            <a:prstGeom prst="rect">
+              <a:avLst/>
+            </a:prstGeom>
+          </p:spPr>
+          <p:style>
+            <a:lnRef idx="1">
+              <a:schemeClr val="accent1"/>
+            </a:lnRef>
+            <a:fillRef idx="3">
+              <a:schemeClr val="accent1"/>
+            </a:fillRef>
+            <a:effectRef idx="2">
+              <a:schemeClr val="accent1"/>
+            </a:effectRef>
+            <a:fontRef idx="minor">
+              <a:schemeClr val="lt1"/>
+            </a:fontRef>
+          </p:style>
+          <p:txBody>
+            <a:bodyPr rtlCol="0" anchor="ctr"/>
+            <a:lstStyle/>
+            <a:p>
+              <a:pPr algn="ctr"/>
+              <a:r>
+                <a:rPr lang="en-US" dirty="0" smtClean="0"/>
+                <a:t>Rectangle</a:t>
+              </a:r>
+              <a:endParaRPr lang="en-US" dirty="0"/>
+            </a:p>
+          </p:txBody>
+        </p:sp>
+        <p:sp>
+          <p:nvSpPr>
+            <p:cNvPr id="6" name="TextBox 5"/>
+            <p:cNvSpPr txBox="1"/>
+            <p:nvPr/>
+          </p:nvSpPr>
+          <p:spPr>
+            <a:xfrm>
+              <a:off x="1752600" y="3810000"/>
+              <a:ext cx="606256" cy="707886"/>
+            </a:xfrm>
+            <a:prstGeom prst="rect">
+              <a:avLst/>
+            </a:prstGeom>
+            <a:noFill/>
+          </p:spPr>
+          <p:txBody>
+            <a:bodyPr wrap="none" rtlCol="0">
+              <a:spAutoFit/>
+            </a:bodyPr>
+            <a:lstStyle/>
+            <a:p>
+              <a:r>
+                <a:rPr lang="en-US" sz="4000" dirty="0" smtClean="0">
+                  <a:solidFill>
+                    <a:schemeClr val="accent1"/>
+                  </a:solidFill>
+                  <a:latin typeface="+mn-lt"/>
+                </a:rPr>
+                <a:t>!=</a:t>
+              </a:r>
+            </a:p>
+          </p:txBody>
+        </p:sp>
       </p:grpSp>
     </p:spTree>
   </p:cSld>
@@ -15772,6 +15656,11 @@
               </a:rPr>
               <a:t>http://butunclebob.com/ArticleS.UncleBob.PrinciplesOfOod</a:t>
             </a:r>
+            <a:endParaRPr lang="en-US" sz="1000" dirty="0" smtClean="0">
+              <a:solidFill>
+                <a:schemeClr val="bg1"/>
+              </a:solidFill>
+            </a:endParaRPr>
           </a:p>
           <a:p>
             <a:pPr eaLnBrk="1" hangingPunct="1">
@@ -15780,7 +15669,7 @@
               </a:lnSpc>
               <a:buNone/>
             </a:pPr>
-            <a:endParaRPr lang="en-US" sz="2000" dirty="0" smtClean="0">
+            <a:endParaRPr lang="en-US" sz="1000" dirty="0" smtClean="0">
               <a:solidFill>
                 <a:schemeClr val="bg1"/>
               </a:solidFill>
@@ -15817,6 +15706,11 @@
               </a:rPr>
               <a:t>http://www.lostechies.com/blogs/chad_myers/archive/2008/03/07/pablo-s-topic-of-the-month-march-solid-principles.aspx</a:t>
             </a:r>
+            <a:endParaRPr lang="en-US" sz="1000" dirty="0" smtClean="0">
+              <a:solidFill>
+                <a:schemeClr val="bg1"/>
+              </a:solidFill>
+            </a:endParaRPr>
           </a:p>
           <a:p>
             <a:pPr eaLnBrk="1" hangingPunct="1">
@@ -15825,7 +15719,7 @@
               </a:lnSpc>
               <a:buNone/>
             </a:pPr>
-            <a:endParaRPr lang="en-US" sz="2000" dirty="0" smtClean="0">
+            <a:endParaRPr lang="en-US" sz="1000" dirty="0" smtClean="0">
               <a:solidFill>
                 <a:schemeClr val="bg1"/>
               </a:solidFill>
@@ -15860,15 +15754,7 @@
                   <a:schemeClr val="bg1"/>
                 </a:solidFill>
               </a:rPr>
-              <a:t>by Robert </a:t>
-            </a:r>
-            <a:r>
-              <a:rPr lang="en-US" sz="2000" smtClean="0">
-                <a:solidFill>
-                  <a:schemeClr val="bg1"/>
-                </a:solidFill>
-              </a:rPr>
-              <a:t>(Uncle Bob) </a:t>
+              <a:t>by Robert (Uncle Bob) Martin and Micah </a:t>
             </a:r>
             <a:r>
               <a:rPr lang="en-US" sz="2000" dirty="0" smtClean="0">
@@ -15876,8 +15762,84 @@
                   <a:schemeClr val="bg1"/>
                 </a:solidFill>
               </a:rPr>
-              <a:t>Martin and Micah Martin</a:t>
+              <a:t>Martin</a:t>
             </a:r>
+            <a:endParaRPr lang="en-US" sz="1000" dirty="0" smtClean="0">
+              <a:solidFill>
+                <a:schemeClr val="bg1"/>
+              </a:solidFill>
+            </a:endParaRPr>
+          </a:p>
+          <a:p>
+            <a:pPr eaLnBrk="1" hangingPunct="1">
+              <a:lnSpc>
+                <a:spcPct val="80000"/>
+              </a:lnSpc>
+              <a:buNone/>
+            </a:pPr>
+            <a:endParaRPr lang="en-US" sz="1000" dirty="0" smtClean="0">
+              <a:solidFill>
+                <a:schemeClr val="bg1"/>
+              </a:solidFill>
+            </a:endParaRPr>
+          </a:p>
+          <a:p>
+            <a:pPr eaLnBrk="1" hangingPunct="1">
+              <a:lnSpc>
+                <a:spcPct val="80000"/>
+              </a:lnSpc>
+              <a:buNone/>
+            </a:pPr>
+            <a:r>
+              <a:rPr lang="en-US" sz="2000" dirty="0" smtClean="0">
+                <a:solidFill>
+                  <a:schemeClr val="bg1"/>
+                </a:solidFill>
+              </a:rPr>
+              <a:t>Pablo’s SOLID E-Book</a:t>
+            </a:r>
+            <a:endParaRPr lang="en-US" sz="2000" dirty="0" smtClean="0">
+              <a:solidFill>
+                <a:schemeClr val="bg1"/>
+              </a:solidFill>
+            </a:endParaRPr>
+          </a:p>
+          <a:p>
+            <a:pPr lvl="1" eaLnBrk="1" hangingPunct="1">
+              <a:lnSpc>
+                <a:spcPct val="80000"/>
+              </a:lnSpc>
+              <a:buNone/>
+            </a:pPr>
+            <a:r>
+              <a:rPr lang="en-US" sz="2000" dirty="0" smtClean="0">
+                <a:solidFill>
+                  <a:schemeClr val="bg1"/>
+                </a:solidFill>
+              </a:rPr>
+              <a:t>http://www.lostechies.com/content/pablo_ebook.aspx</a:t>
+            </a:r>
+          </a:p>
+          <a:p>
+            <a:pPr eaLnBrk="1" hangingPunct="1">
+              <a:lnSpc>
+                <a:spcPct val="80000"/>
+              </a:lnSpc>
+              <a:buNone/>
+            </a:pPr>
+            <a:r>
+              <a:rPr lang="en-US" sz="2000" dirty="0" smtClean="0">
+                <a:solidFill>
+                  <a:schemeClr val="bg1"/>
+                </a:solidFill>
+              </a:rPr>
+              <a:t>	</a:t>
+            </a:r>
+            <a:endParaRPr lang="en-US" sz="2000" dirty="0" smtClean="0">
+              <a:solidFill>
+                <a:schemeClr val="bg1"/>
+              </a:solidFill>
+            </a:endParaRPr>
           </a:p>
         </p:txBody>
       </p:sp>
@@ -20874,21 +20836,6 @@
 </file>
 
 <file path=customXml/item1.xml><?xml version="1.0" encoding="utf-8"?>
-<p:properties xmlns:p="http://schemas.microsoft.com/office/2006/metadata/properties" xmlns:xsi="http://www.w3.org/2001/XMLSchema-instance">
-  <documentManagement/>
-</p:properties>
-</file>
-
-<file path=customXml/item2.xml><?xml version="1.0" encoding="utf-8"?>
-<?mso-contentType ?>
-<FormTemplates xmlns="http://schemas.microsoft.com/sharepoint/v3/contenttype/forms">
-  <Display>DocumentLibraryForm</Display>
-  <Edit>DocumentLibraryForm</Edit>
-  <New>DocumentLibraryForm</New>
-</FormTemplates>
-</file>
-
-<file path=customXml/item3.xml><?xml version="1.0" encoding="utf-8"?>
 <ct:contentTypeSchema xmlns:ct="http://schemas.microsoft.com/office/2006/metadata/contentType" xmlns:ma="http://schemas.microsoft.com/office/2006/metadata/properties/metaAttributes" ct:_="" ma:_="" ma:contentTypeName="Document" ma:contentTypeID="0x0101005857B3975182FB47B67FAAA67052062C" ma:contentTypeVersion="0" ma:contentTypeDescription="Create a new document." ma:contentTypeScope="" ma:versionID="a1781edd533abf786dc62ee7dded643a">
   <xsd:schema xmlns:xsd="http://www.w3.org/2001/XMLSchema" xmlns:p="http://schemas.microsoft.com/office/2006/metadata/properties" targetNamespace="http://schemas.microsoft.com/office/2006/metadata/properties" ma:root="true" ma:fieldsID="4aeb20c0e3442673af7ee10786458764">
     <xsd:element name="properties">
@@ -20937,10 +20884,32 @@
 </ct:contentTypeSchema>
 </file>
 
+<file path=customXml/item2.xml><?xml version="1.0" encoding="utf-8"?>
+<?mso-contentType ?>
+<FormTemplates xmlns="http://schemas.microsoft.com/sharepoint/v3/contenttype/forms">
+  <Display>DocumentLibraryForm</Display>
+  <Edit>DocumentLibraryForm</Edit>
+  <New>DocumentLibraryForm</New>
+</FormTemplates>
+</file>
+
+<file path=customXml/item3.xml><?xml version="1.0" encoding="utf-8"?>
+<p:properties xmlns:p="http://schemas.microsoft.com/office/2006/metadata/properties" xmlns:xsi="http://www.w3.org/2001/XMLSchema-instance">
+  <documentManagement/>
+</p:properties>
+</file>
+
 <file path=customXml/itemProps1.xml><?xml version="1.0" encoding="utf-8"?>
-<ds:datastoreItem xmlns:ds="http://schemas.openxmlformats.org/officeDocument/2006/customXml" ds:itemID="{F8AADC7F-5DC4-46F2-A809-0679B041C012}">
+<ds:datastoreItem xmlns:ds="http://schemas.openxmlformats.org/officeDocument/2006/customXml" ds:itemID="{D3EBC05E-93E3-47EC-A4AA-B305F2941009}">
   <ds:schemaRefs>
+    <ds:schemaRef ds:uri="http://schemas.microsoft.com/office/2006/metadata/contentType"/>
+    <ds:schemaRef ds:uri="http://schemas.microsoft.com/office/2006/metadata/properties/metaAttributes"/>
+    <ds:schemaRef ds:uri="http://www.w3.org/2001/XMLSchema"/>
     <ds:schemaRef ds:uri="http://schemas.microsoft.com/office/2006/metadata/properties"/>
+    <ds:schemaRef ds:uri="http://schemas.openxmlformats.org/package/2006/metadata/core-properties"/>
+    <ds:schemaRef ds:uri="http://purl.org/dc/elements/1.1/"/>
+    <ds:schemaRef ds:uri="http://purl.org/dc/terms/"/>
+    <ds:schemaRef ds:uri="http://schemas.microsoft.com/office/internal/2005/internalDocumentation"/>
   </ds:schemaRefs>
 </ds:datastoreItem>
 </file>
@@ -20954,16 +20923,9 @@
 </file>
 
 <file path=customXml/itemProps3.xml><?xml version="1.0" encoding="utf-8"?>
-<ds:datastoreItem xmlns:ds="http://schemas.openxmlformats.org/officeDocument/2006/customXml" ds:itemID="{D3EBC05E-93E3-47EC-A4AA-B305F2941009}">
+<ds:datastoreItem xmlns:ds="http://schemas.openxmlformats.org/officeDocument/2006/customXml" ds:itemID="{F8AADC7F-5DC4-46F2-A809-0679B041C012}">
   <ds:schemaRefs>
-    <ds:schemaRef ds:uri="http://schemas.microsoft.com/office/2006/metadata/contentType"/>
-    <ds:schemaRef ds:uri="http://schemas.microsoft.com/office/2006/metadata/properties/metaAttributes"/>
-    <ds:schemaRef ds:uri="http://www.w3.org/2001/XMLSchema"/>
     <ds:schemaRef ds:uri="http://schemas.microsoft.com/office/2006/metadata/properties"/>
-    <ds:schemaRef ds:uri="http://schemas.openxmlformats.org/package/2006/metadata/core-properties"/>
-    <ds:schemaRef ds:uri="http://purl.org/dc/elements/1.1/"/>
-    <ds:schemaRef ds:uri="http://purl.org/dc/terms/"/>
-    <ds:schemaRef ds:uri="http://schemas.microsoft.com/office/internal/2005/internalDocumentation"/>
   </ds:schemaRefs>
 </ds:datastoreItem>
 </file>
</xml_diff>

<commit_message>
updating solid presentation ending slides... fixing typo
</commit_message>
<xml_diff>
--- a/SOLID Principles - Step By Step Code/SOLID Principles Presentation.pptx
+++ b/SOLID Principles - Step By Step Code/SOLID Principles Presentation.pptx
@@ -13,8 +13,8 @@
   <p:sldIdLst>
     <p:sldId id="292" r:id="rId5"/>
     <p:sldId id="256" r:id="rId6"/>
-    <p:sldId id="257" r:id="rId7"/>
-    <p:sldId id="285" r:id="rId8"/>
+    <p:sldId id="285" r:id="rId7"/>
+    <p:sldId id="257" r:id="rId8"/>
     <p:sldId id="284" r:id="rId9"/>
     <p:sldId id="280" r:id="rId10"/>
     <p:sldId id="258" r:id="rId11"/>
@@ -282,7 +282,7 @@
               <a:pPr>
                 <a:defRPr/>
               </a:pPr>
-              <a:t>6/3/2009</a:t>
+              <a:t>7/8/2009</a:t>
             </a:fld>
             <a:endParaRPr lang="en-US"/>
           </a:p>
@@ -460,7 +460,7 @@
               <a:pPr>
                 <a:defRPr/>
               </a:pPr>
-              <a:t>6/3/2009</a:t>
+              <a:t>7/8/2009</a:t>
             </a:fld>
             <a:endParaRPr lang="en-US"/>
           </a:p>
@@ -8948,7 +8948,7 @@
         <p:spPr>
           <a:xfrm>
             <a:off x="685800" y="1066800"/>
-            <a:ext cx="8229600" cy="1219200"/>
+            <a:ext cx="8229600" cy="1295400"/>
           </a:xfrm>
         </p:spPr>
         <p:txBody>
@@ -8960,7 +8960,7 @@
             </a:pPr>
             <a:r>
               <a:rPr lang="en-US" dirty="0" smtClean="0"/>
-              <a:t>Cohesion:</a:t>
+              <a:t>Coupling:</a:t>
             </a:r>
           </a:p>
           <a:p>
@@ -8969,7 +8969,7 @@
             </a:pPr>
             <a:r>
               <a:rPr lang="en-US" sz="2000" dirty="0" smtClean="0"/>
-              <a:t>“A measure of how strongly-related and focused the various responsibilities of a software module are” - </a:t>
+              <a:t>“The degree to which each program module relies on each one of the other modules” – </a:t>
             </a:r>
             <a:r>
               <a:rPr lang="en-US" sz="2000" dirty="0" smtClean="0">
@@ -8977,7 +8977,6 @@
               </a:rPr>
               <a:t>Wikipedia</a:t>
             </a:r>
-            <a:endParaRPr lang="en-US" sz="2000" dirty="0" smtClean="0"/>
           </a:p>
         </p:txBody>
       </p:sp>
@@ -9015,39 +9014,1297 @@
           </a:p>
         </p:txBody>
       </p:sp>
-      <p:pic>
-        <p:nvPicPr>
-          <p:cNvPr id="1026" name="Picture 2"/>
-          <p:cNvPicPr>
-            <a:picLocks noChangeAspect="1" noChangeArrowheads="1"/>
-          </p:cNvPicPr>
+      <p:grpSp>
+        <p:nvGrpSpPr>
+          <p:cNvPr id="4" name="Group 3"/>
+          <p:cNvGrpSpPr/>
           <p:nvPr/>
-        </p:nvPicPr>
-        <p:blipFill>
-          <a:blip r:embed="rId4"/>
-          <a:srcRect/>
-          <a:stretch>
-            <a:fillRect/>
-          </a:stretch>
-        </p:blipFill>
-        <p:spPr bwMode="auto">
+        </p:nvGrpSpPr>
+        <p:grpSpPr>
           <a:xfrm>
-            <a:off x="2428875" y="2762250"/>
-            <a:ext cx="4286250" cy="3333750"/>
+            <a:off x="1257300" y="2971800"/>
+            <a:ext cx="6629400" cy="2743200"/>
+            <a:chOff x="609600" y="3124200"/>
+            <a:chExt cx="6629400" cy="2743200"/>
           </a:xfrm>
-          <a:prstGeom prst="rect">
-            <a:avLst/>
-          </a:prstGeom>
-          <a:noFill/>
-          <a:ln w="9525">
-            <a:noFill/>
-            <a:miter lim="800000"/>
-            <a:headEnd/>
-            <a:tailEnd/>
-          </a:ln>
-          <a:effectLst/>
-        </p:spPr>
-      </p:pic>
+          <a:scene3d>
+            <a:camera prst="perspectiveAbove"/>
+            <a:lightRig rig="threePt" dir="t"/>
+          </a:scene3d>
+        </p:grpSpPr>
+        <p:sp>
+          <p:nvSpPr>
+            <p:cNvPr id="5" name="Rectangle 4"/>
+            <p:cNvSpPr/>
+            <p:nvPr/>
+          </p:nvSpPr>
+          <p:spPr>
+            <a:xfrm>
+              <a:off x="1524000" y="3352800"/>
+              <a:ext cx="990600" cy="533400"/>
+            </a:xfrm>
+            <a:prstGeom prst="rect">
+              <a:avLst/>
+            </a:prstGeom>
+          </p:spPr>
+          <p:style>
+            <a:lnRef idx="1">
+              <a:schemeClr val="accent1"/>
+            </a:lnRef>
+            <a:fillRef idx="3">
+              <a:schemeClr val="accent1"/>
+            </a:fillRef>
+            <a:effectRef idx="2">
+              <a:schemeClr val="accent1"/>
+            </a:effectRef>
+            <a:fontRef idx="minor">
+              <a:schemeClr val="lt1"/>
+            </a:fontRef>
+          </p:style>
+          <p:txBody>
+            <a:bodyPr rtlCol="0" anchor="ctr"/>
+            <a:lstStyle/>
+            <a:p>
+              <a:pPr algn="ctr"/>
+              <a:endParaRPr lang="en-US"/>
+            </a:p>
+          </p:txBody>
+        </p:sp>
+        <p:sp>
+          <p:nvSpPr>
+            <p:cNvPr id="6" name="Rectangle 5"/>
+            <p:cNvSpPr/>
+            <p:nvPr/>
+          </p:nvSpPr>
+          <p:spPr>
+            <a:xfrm>
+              <a:off x="2667000" y="4495800"/>
+              <a:ext cx="990600" cy="533400"/>
+            </a:xfrm>
+            <a:prstGeom prst="rect">
+              <a:avLst/>
+            </a:prstGeom>
+          </p:spPr>
+          <p:style>
+            <a:lnRef idx="1">
+              <a:schemeClr val="accent2"/>
+            </a:lnRef>
+            <a:fillRef idx="3">
+              <a:schemeClr val="accent2"/>
+            </a:fillRef>
+            <a:effectRef idx="2">
+              <a:schemeClr val="accent2"/>
+            </a:effectRef>
+            <a:fontRef idx="minor">
+              <a:schemeClr val="lt1"/>
+            </a:fontRef>
+          </p:style>
+          <p:txBody>
+            <a:bodyPr rtlCol="0" anchor="ctr"/>
+            <a:lstStyle/>
+            <a:p>
+              <a:pPr algn="ctr"/>
+              <a:endParaRPr lang="en-US"/>
+            </a:p>
+          </p:txBody>
+        </p:sp>
+        <p:sp>
+          <p:nvSpPr>
+            <p:cNvPr id="7" name="Rectangle 6"/>
+            <p:cNvSpPr/>
+            <p:nvPr/>
+          </p:nvSpPr>
+          <p:spPr>
+            <a:xfrm>
+              <a:off x="3200400" y="3124200"/>
+              <a:ext cx="990600" cy="533400"/>
+            </a:xfrm>
+            <a:prstGeom prst="rect">
+              <a:avLst/>
+            </a:prstGeom>
+          </p:spPr>
+          <p:style>
+            <a:lnRef idx="1">
+              <a:schemeClr val="accent1"/>
+            </a:lnRef>
+            <a:fillRef idx="3">
+              <a:schemeClr val="accent1"/>
+            </a:fillRef>
+            <a:effectRef idx="2">
+              <a:schemeClr val="accent1"/>
+            </a:effectRef>
+            <a:fontRef idx="minor">
+              <a:schemeClr val="lt1"/>
+            </a:fontRef>
+          </p:style>
+          <p:txBody>
+            <a:bodyPr rtlCol="0" anchor="ctr"/>
+            <a:lstStyle/>
+            <a:p>
+              <a:pPr algn="ctr"/>
+              <a:endParaRPr lang="en-US"/>
+            </a:p>
+          </p:txBody>
+        </p:sp>
+        <p:sp>
+          <p:nvSpPr>
+            <p:cNvPr id="8" name="Rectangle 7"/>
+            <p:cNvSpPr/>
+            <p:nvPr/>
+          </p:nvSpPr>
+          <p:spPr>
+            <a:xfrm>
+              <a:off x="1447800" y="5181600"/>
+              <a:ext cx="990600" cy="533400"/>
+            </a:xfrm>
+            <a:prstGeom prst="rect">
+              <a:avLst/>
+            </a:prstGeom>
+          </p:spPr>
+          <p:style>
+            <a:lnRef idx="1">
+              <a:schemeClr val="accent1"/>
+            </a:lnRef>
+            <a:fillRef idx="3">
+              <a:schemeClr val="accent1"/>
+            </a:fillRef>
+            <a:effectRef idx="2">
+              <a:schemeClr val="accent1"/>
+            </a:effectRef>
+            <a:fontRef idx="minor">
+              <a:schemeClr val="lt1"/>
+            </a:fontRef>
+          </p:style>
+          <p:txBody>
+            <a:bodyPr rtlCol="0" anchor="ctr"/>
+            <a:lstStyle/>
+            <a:p>
+              <a:pPr algn="ctr"/>
+              <a:endParaRPr lang="en-US"/>
+            </a:p>
+          </p:txBody>
+        </p:sp>
+        <p:sp>
+          <p:nvSpPr>
+            <p:cNvPr id="9" name="Rectangle 8"/>
+            <p:cNvSpPr/>
+            <p:nvPr/>
+          </p:nvSpPr>
+          <p:spPr>
+            <a:xfrm>
+              <a:off x="3352800" y="5334000"/>
+              <a:ext cx="990600" cy="533400"/>
+            </a:xfrm>
+            <a:prstGeom prst="rect">
+              <a:avLst/>
+            </a:prstGeom>
+          </p:spPr>
+          <p:style>
+            <a:lnRef idx="1">
+              <a:schemeClr val="accent1"/>
+            </a:lnRef>
+            <a:fillRef idx="3">
+              <a:schemeClr val="accent1"/>
+            </a:fillRef>
+            <a:effectRef idx="2">
+              <a:schemeClr val="accent1"/>
+            </a:effectRef>
+            <a:fontRef idx="minor">
+              <a:schemeClr val="lt1"/>
+            </a:fontRef>
+          </p:style>
+          <p:txBody>
+            <a:bodyPr rtlCol="0" anchor="ctr"/>
+            <a:lstStyle/>
+            <a:p>
+              <a:pPr algn="ctr"/>
+              <a:endParaRPr lang="en-US"/>
+            </a:p>
+          </p:txBody>
+        </p:sp>
+        <p:sp>
+          <p:nvSpPr>
+            <p:cNvPr id="10" name="Rectangle 9"/>
+            <p:cNvSpPr/>
+            <p:nvPr/>
+          </p:nvSpPr>
+          <p:spPr>
+            <a:xfrm>
+              <a:off x="4038600" y="4191000"/>
+              <a:ext cx="990600" cy="533400"/>
+            </a:xfrm>
+            <a:prstGeom prst="rect">
+              <a:avLst/>
+            </a:prstGeom>
+          </p:spPr>
+          <p:style>
+            <a:lnRef idx="1">
+              <a:schemeClr val="accent1"/>
+            </a:lnRef>
+            <a:fillRef idx="3">
+              <a:schemeClr val="accent1"/>
+            </a:fillRef>
+            <a:effectRef idx="2">
+              <a:schemeClr val="accent1"/>
+            </a:effectRef>
+            <a:fontRef idx="minor">
+              <a:schemeClr val="lt1"/>
+            </a:fontRef>
+          </p:style>
+          <p:txBody>
+            <a:bodyPr rtlCol="0" anchor="ctr"/>
+            <a:lstStyle/>
+            <a:p>
+              <a:pPr algn="ctr"/>
+              <a:endParaRPr lang="en-US"/>
+            </a:p>
+          </p:txBody>
+        </p:sp>
+        <p:sp>
+          <p:nvSpPr>
+            <p:cNvPr id="11" name="Rectangle 10"/>
+            <p:cNvSpPr/>
+            <p:nvPr/>
+          </p:nvSpPr>
+          <p:spPr>
+            <a:xfrm>
+              <a:off x="5105400" y="3276600"/>
+              <a:ext cx="990600" cy="533400"/>
+            </a:xfrm>
+            <a:prstGeom prst="rect">
+              <a:avLst/>
+            </a:prstGeom>
+          </p:spPr>
+          <p:style>
+            <a:lnRef idx="1">
+              <a:schemeClr val="accent1"/>
+            </a:lnRef>
+            <a:fillRef idx="3">
+              <a:schemeClr val="accent1"/>
+            </a:fillRef>
+            <a:effectRef idx="2">
+              <a:schemeClr val="accent1"/>
+            </a:effectRef>
+            <a:fontRef idx="minor">
+              <a:schemeClr val="lt1"/>
+            </a:fontRef>
+          </p:style>
+          <p:txBody>
+            <a:bodyPr rtlCol="0" anchor="ctr"/>
+            <a:lstStyle/>
+            <a:p>
+              <a:pPr algn="ctr"/>
+              <a:endParaRPr lang="en-US"/>
+            </a:p>
+          </p:txBody>
+        </p:sp>
+        <p:sp>
+          <p:nvSpPr>
+            <p:cNvPr id="12" name="Rectangle 11"/>
+            <p:cNvSpPr/>
+            <p:nvPr/>
+          </p:nvSpPr>
+          <p:spPr>
+            <a:xfrm>
+              <a:off x="609600" y="4191000"/>
+              <a:ext cx="990600" cy="533400"/>
+            </a:xfrm>
+            <a:prstGeom prst="rect">
+              <a:avLst/>
+            </a:prstGeom>
+          </p:spPr>
+          <p:style>
+            <a:lnRef idx="1">
+              <a:schemeClr val="accent1"/>
+            </a:lnRef>
+            <a:fillRef idx="3">
+              <a:schemeClr val="accent1"/>
+            </a:fillRef>
+            <a:effectRef idx="2">
+              <a:schemeClr val="accent1"/>
+            </a:effectRef>
+            <a:fontRef idx="minor">
+              <a:schemeClr val="lt1"/>
+            </a:fontRef>
+          </p:style>
+          <p:txBody>
+            <a:bodyPr rtlCol="0" anchor="ctr"/>
+            <a:lstStyle/>
+            <a:p>
+              <a:pPr algn="ctr"/>
+              <a:endParaRPr lang="en-US"/>
+            </a:p>
+          </p:txBody>
+        </p:sp>
+        <p:sp>
+          <p:nvSpPr>
+            <p:cNvPr id="13" name="Rectangle 12"/>
+            <p:cNvSpPr/>
+            <p:nvPr/>
+          </p:nvSpPr>
+          <p:spPr>
+            <a:xfrm>
+              <a:off x="5257800" y="5181600"/>
+              <a:ext cx="990600" cy="533400"/>
+            </a:xfrm>
+            <a:prstGeom prst="rect">
+              <a:avLst/>
+            </a:prstGeom>
+          </p:spPr>
+          <p:style>
+            <a:lnRef idx="1">
+              <a:schemeClr val="accent1"/>
+            </a:lnRef>
+            <a:fillRef idx="3">
+              <a:schemeClr val="accent1"/>
+            </a:fillRef>
+            <a:effectRef idx="2">
+              <a:schemeClr val="accent1"/>
+            </a:effectRef>
+            <a:fontRef idx="minor">
+              <a:schemeClr val="lt1"/>
+            </a:fontRef>
+          </p:style>
+          <p:txBody>
+            <a:bodyPr rtlCol="0" anchor="ctr"/>
+            <a:lstStyle/>
+            <a:p>
+              <a:pPr algn="ctr"/>
+              <a:endParaRPr lang="en-US"/>
+            </a:p>
+          </p:txBody>
+        </p:sp>
+        <p:sp>
+          <p:nvSpPr>
+            <p:cNvPr id="14" name="Rectangle 13"/>
+            <p:cNvSpPr/>
+            <p:nvPr/>
+          </p:nvSpPr>
+          <p:spPr>
+            <a:xfrm>
+              <a:off x="6248400" y="4191000"/>
+              <a:ext cx="990600" cy="533400"/>
+            </a:xfrm>
+            <a:prstGeom prst="rect">
+              <a:avLst/>
+            </a:prstGeom>
+          </p:spPr>
+          <p:style>
+            <a:lnRef idx="1">
+              <a:schemeClr val="accent1"/>
+            </a:lnRef>
+            <a:fillRef idx="3">
+              <a:schemeClr val="accent1"/>
+            </a:fillRef>
+            <a:effectRef idx="2">
+              <a:schemeClr val="accent1"/>
+            </a:effectRef>
+            <a:fontRef idx="minor">
+              <a:schemeClr val="lt1"/>
+            </a:fontRef>
+          </p:style>
+          <p:txBody>
+            <a:bodyPr rtlCol="0" anchor="ctr"/>
+            <a:lstStyle/>
+            <a:p>
+              <a:pPr algn="ctr"/>
+              <a:endParaRPr lang="en-US"/>
+            </a:p>
+          </p:txBody>
+        </p:sp>
+        <p:cxnSp>
+          <p:nvCxnSpPr>
+            <p:cNvPr id="15" name="Elbow Connector 14"/>
+            <p:cNvCxnSpPr>
+              <a:stCxn id="5" idx="3"/>
+              <a:endCxn id="6" idx="0"/>
+            </p:cNvCxnSpPr>
+            <p:nvPr/>
+          </p:nvCxnSpPr>
+          <p:spPr>
+            <a:xfrm>
+              <a:off x="2514600" y="3619500"/>
+              <a:ext cx="647700" cy="876300"/>
+            </a:xfrm>
+            <a:prstGeom prst="bentConnector2">
+              <a:avLst/>
+            </a:prstGeom>
+            <a:ln>
+              <a:tailEnd type="arrow"/>
+            </a:ln>
+          </p:spPr>
+          <p:style>
+            <a:lnRef idx="1">
+              <a:schemeClr val="accent1"/>
+            </a:lnRef>
+            <a:fillRef idx="3">
+              <a:schemeClr val="accent1"/>
+            </a:fillRef>
+            <a:effectRef idx="2">
+              <a:schemeClr val="accent1"/>
+            </a:effectRef>
+            <a:fontRef idx="minor">
+              <a:schemeClr val="lt1"/>
+            </a:fontRef>
+          </p:style>
+        </p:cxnSp>
+        <p:cxnSp>
+          <p:nvCxnSpPr>
+            <p:cNvPr id="16" name="Elbow Connector 14"/>
+            <p:cNvCxnSpPr>
+              <a:stCxn id="5" idx="1"/>
+              <a:endCxn id="12" idx="0"/>
+            </p:cNvCxnSpPr>
+            <p:nvPr/>
+          </p:nvCxnSpPr>
+          <p:spPr>
+            <a:xfrm rot="10800000" flipV="1">
+              <a:off x="1104900" y="3619500"/>
+              <a:ext cx="419100" cy="571500"/>
+            </a:xfrm>
+            <a:prstGeom prst="bentConnector2">
+              <a:avLst/>
+            </a:prstGeom>
+            <a:ln>
+              <a:tailEnd type="arrow"/>
+            </a:ln>
+          </p:spPr>
+          <p:style>
+            <a:lnRef idx="1">
+              <a:schemeClr val="accent1"/>
+            </a:lnRef>
+            <a:fillRef idx="3">
+              <a:schemeClr val="accent1"/>
+            </a:fillRef>
+            <a:effectRef idx="2">
+              <a:schemeClr val="accent1"/>
+            </a:effectRef>
+            <a:fontRef idx="minor">
+              <a:schemeClr val="lt1"/>
+            </a:fontRef>
+          </p:style>
+        </p:cxnSp>
+        <p:cxnSp>
+          <p:nvCxnSpPr>
+            <p:cNvPr id="17" name="Elbow Connector 14"/>
+            <p:cNvCxnSpPr>
+              <a:stCxn id="6" idx="1"/>
+              <a:endCxn id="5" idx="2"/>
+            </p:cNvCxnSpPr>
+            <p:nvPr/>
+          </p:nvCxnSpPr>
+          <p:spPr>
+            <a:xfrm rot="10800000">
+              <a:off x="2019300" y="3886200"/>
+              <a:ext cx="647700" cy="876300"/>
+            </a:xfrm>
+            <a:prstGeom prst="bentConnector2">
+              <a:avLst/>
+            </a:prstGeom>
+            <a:ln>
+              <a:tailEnd type="arrow"/>
+            </a:ln>
+          </p:spPr>
+          <p:style>
+            <a:lnRef idx="1">
+              <a:schemeClr val="accent1"/>
+            </a:lnRef>
+            <a:fillRef idx="3">
+              <a:schemeClr val="accent1"/>
+            </a:fillRef>
+            <a:effectRef idx="2">
+              <a:schemeClr val="accent1"/>
+            </a:effectRef>
+            <a:fontRef idx="minor">
+              <a:schemeClr val="lt1"/>
+            </a:fontRef>
+          </p:style>
+        </p:cxnSp>
+        <p:cxnSp>
+          <p:nvCxnSpPr>
+            <p:cNvPr id="18" name="Elbow Connector 14"/>
+            <p:cNvCxnSpPr>
+              <a:stCxn id="7" idx="2"/>
+              <a:endCxn id="6" idx="0"/>
+            </p:cNvCxnSpPr>
+            <p:nvPr/>
+          </p:nvCxnSpPr>
+          <p:spPr>
+            <a:xfrm rot="5400000">
+              <a:off x="3009900" y="3810000"/>
+              <a:ext cx="838200" cy="533400"/>
+            </a:xfrm>
+            <a:prstGeom prst="bentConnector3">
+              <a:avLst>
+                <a:gd name="adj1" fmla="val 50000"/>
+              </a:avLst>
+            </a:prstGeom>
+            <a:ln>
+              <a:tailEnd type="arrow"/>
+            </a:ln>
+          </p:spPr>
+          <p:style>
+            <a:lnRef idx="1">
+              <a:schemeClr val="accent1"/>
+            </a:lnRef>
+            <a:fillRef idx="3">
+              <a:schemeClr val="accent1"/>
+            </a:fillRef>
+            <a:effectRef idx="2">
+              <a:schemeClr val="accent1"/>
+            </a:effectRef>
+            <a:fontRef idx="minor">
+              <a:schemeClr val="lt1"/>
+            </a:fontRef>
+          </p:style>
+        </p:cxnSp>
+        <p:cxnSp>
+          <p:nvCxnSpPr>
+            <p:cNvPr id="19" name="Elbow Connector 14"/>
+            <p:cNvCxnSpPr>
+              <a:stCxn id="10" idx="0"/>
+              <a:endCxn id="7" idx="3"/>
+            </p:cNvCxnSpPr>
+            <p:nvPr/>
+          </p:nvCxnSpPr>
+          <p:spPr>
+            <a:xfrm rot="16200000" flipV="1">
+              <a:off x="3962400" y="3619500"/>
+              <a:ext cx="800100" cy="342900"/>
+            </a:xfrm>
+            <a:prstGeom prst="bentConnector2">
+              <a:avLst/>
+            </a:prstGeom>
+            <a:ln>
+              <a:tailEnd type="arrow"/>
+            </a:ln>
+          </p:spPr>
+          <p:style>
+            <a:lnRef idx="1">
+              <a:schemeClr val="accent1"/>
+            </a:lnRef>
+            <a:fillRef idx="3">
+              <a:schemeClr val="accent1"/>
+            </a:fillRef>
+            <a:effectRef idx="2">
+              <a:schemeClr val="accent1"/>
+            </a:effectRef>
+            <a:fontRef idx="minor">
+              <a:schemeClr val="lt1"/>
+            </a:fontRef>
+          </p:style>
+        </p:cxnSp>
+        <p:cxnSp>
+          <p:nvCxnSpPr>
+            <p:cNvPr id="20" name="Elbow Connector 14"/>
+            <p:cNvCxnSpPr>
+              <a:stCxn id="8" idx="3"/>
+              <a:endCxn id="9" idx="1"/>
+            </p:cNvCxnSpPr>
+            <p:nvPr/>
+          </p:nvCxnSpPr>
+          <p:spPr>
+            <a:xfrm>
+              <a:off x="2438400" y="5448300"/>
+              <a:ext cx="914400" cy="152400"/>
+            </a:xfrm>
+            <a:prstGeom prst="bentConnector3">
+              <a:avLst>
+                <a:gd name="adj1" fmla="val 50000"/>
+              </a:avLst>
+            </a:prstGeom>
+            <a:ln>
+              <a:tailEnd type="arrow"/>
+            </a:ln>
+          </p:spPr>
+          <p:style>
+            <a:lnRef idx="1">
+              <a:schemeClr val="accent1"/>
+            </a:lnRef>
+            <a:fillRef idx="3">
+              <a:schemeClr val="accent1"/>
+            </a:fillRef>
+            <a:effectRef idx="2">
+              <a:schemeClr val="accent1"/>
+            </a:effectRef>
+            <a:fontRef idx="minor">
+              <a:schemeClr val="lt1"/>
+            </a:fontRef>
+          </p:style>
+        </p:cxnSp>
+        <p:cxnSp>
+          <p:nvCxnSpPr>
+            <p:cNvPr id="21" name="Elbow Connector 14"/>
+            <p:cNvCxnSpPr>
+              <a:stCxn id="9" idx="0"/>
+              <a:endCxn id="6" idx="2"/>
+            </p:cNvCxnSpPr>
+            <p:nvPr/>
+          </p:nvCxnSpPr>
+          <p:spPr>
+            <a:xfrm rot="16200000" flipV="1">
+              <a:off x="3352800" y="4838700"/>
+              <a:ext cx="304800" cy="685800"/>
+            </a:xfrm>
+            <a:prstGeom prst="bentConnector3">
+              <a:avLst>
+                <a:gd name="adj1" fmla="val 50000"/>
+              </a:avLst>
+            </a:prstGeom>
+            <a:ln>
+              <a:tailEnd type="arrow"/>
+            </a:ln>
+          </p:spPr>
+          <p:style>
+            <a:lnRef idx="1">
+              <a:schemeClr val="accent1"/>
+            </a:lnRef>
+            <a:fillRef idx="3">
+              <a:schemeClr val="accent1"/>
+            </a:fillRef>
+            <a:effectRef idx="2">
+              <a:schemeClr val="accent1"/>
+            </a:effectRef>
+            <a:fontRef idx="minor">
+              <a:schemeClr val="lt1"/>
+            </a:fontRef>
+          </p:style>
+        </p:cxnSp>
+        <p:cxnSp>
+          <p:nvCxnSpPr>
+            <p:cNvPr id="22" name="Elbow Connector 14"/>
+            <p:cNvCxnSpPr>
+              <a:stCxn id="12" idx="3"/>
+              <a:endCxn id="8" idx="0"/>
+            </p:cNvCxnSpPr>
+            <p:nvPr/>
+          </p:nvCxnSpPr>
+          <p:spPr>
+            <a:xfrm>
+              <a:off x="1600200" y="4457700"/>
+              <a:ext cx="342900" cy="723900"/>
+            </a:xfrm>
+            <a:prstGeom prst="bentConnector2">
+              <a:avLst/>
+            </a:prstGeom>
+            <a:ln>
+              <a:tailEnd type="arrow"/>
+            </a:ln>
+          </p:spPr>
+          <p:style>
+            <a:lnRef idx="1">
+              <a:schemeClr val="accent1"/>
+            </a:lnRef>
+            <a:fillRef idx="3">
+              <a:schemeClr val="accent1"/>
+            </a:fillRef>
+            <a:effectRef idx="2">
+              <a:schemeClr val="accent1"/>
+            </a:effectRef>
+            <a:fontRef idx="minor">
+              <a:schemeClr val="lt1"/>
+            </a:fontRef>
+          </p:style>
+        </p:cxnSp>
+        <p:cxnSp>
+          <p:nvCxnSpPr>
+            <p:cNvPr id="23" name="Elbow Connector 14"/>
+            <p:cNvCxnSpPr>
+              <a:stCxn id="6" idx="1"/>
+              <a:endCxn id="8" idx="0"/>
+            </p:cNvCxnSpPr>
+            <p:nvPr/>
+          </p:nvCxnSpPr>
+          <p:spPr>
+            <a:xfrm rot="10800000" flipV="1">
+              <a:off x="1943100" y="4762500"/>
+              <a:ext cx="723900" cy="419100"/>
+            </a:xfrm>
+            <a:prstGeom prst="bentConnector2">
+              <a:avLst/>
+            </a:prstGeom>
+            <a:ln>
+              <a:tailEnd type="arrow"/>
+            </a:ln>
+          </p:spPr>
+          <p:style>
+            <a:lnRef idx="1">
+              <a:schemeClr val="accent1"/>
+            </a:lnRef>
+            <a:fillRef idx="3">
+              <a:schemeClr val="accent1"/>
+            </a:fillRef>
+            <a:effectRef idx="2">
+              <a:schemeClr val="accent1"/>
+            </a:effectRef>
+            <a:fontRef idx="minor">
+              <a:schemeClr val="lt1"/>
+            </a:fontRef>
+          </p:style>
+        </p:cxnSp>
+        <p:cxnSp>
+          <p:nvCxnSpPr>
+            <p:cNvPr id="24" name="Elbow Connector 14"/>
+            <p:cNvCxnSpPr>
+              <a:stCxn id="10" idx="1"/>
+              <a:endCxn id="6" idx="3"/>
+            </p:cNvCxnSpPr>
+            <p:nvPr/>
+          </p:nvCxnSpPr>
+          <p:spPr>
+            <a:xfrm rot="10800000" flipV="1">
+              <a:off x="3657600" y="4457700"/>
+              <a:ext cx="381000" cy="304800"/>
+            </a:xfrm>
+            <a:prstGeom prst="bentConnector3">
+              <a:avLst>
+                <a:gd name="adj1" fmla="val 50000"/>
+              </a:avLst>
+            </a:prstGeom>
+            <a:ln>
+              <a:tailEnd type="arrow"/>
+            </a:ln>
+          </p:spPr>
+          <p:style>
+            <a:lnRef idx="1">
+              <a:schemeClr val="accent1"/>
+            </a:lnRef>
+            <a:fillRef idx="3">
+              <a:schemeClr val="accent1"/>
+            </a:fillRef>
+            <a:effectRef idx="2">
+              <a:schemeClr val="accent1"/>
+            </a:effectRef>
+            <a:fontRef idx="minor">
+              <a:schemeClr val="lt1"/>
+            </a:fontRef>
+          </p:style>
+        </p:cxnSp>
+        <p:cxnSp>
+          <p:nvCxnSpPr>
+            <p:cNvPr id="25" name="Elbow Connector 14"/>
+            <p:cNvCxnSpPr>
+              <a:stCxn id="10" idx="2"/>
+              <a:endCxn id="9" idx="3"/>
+            </p:cNvCxnSpPr>
+            <p:nvPr/>
+          </p:nvCxnSpPr>
+          <p:spPr>
+            <a:xfrm rot="5400000">
+              <a:off x="4000500" y="5067300"/>
+              <a:ext cx="876300" cy="190500"/>
+            </a:xfrm>
+            <a:prstGeom prst="bentConnector2">
+              <a:avLst/>
+            </a:prstGeom>
+            <a:ln>
+              <a:tailEnd type="arrow"/>
+            </a:ln>
+          </p:spPr>
+          <p:style>
+            <a:lnRef idx="1">
+              <a:schemeClr val="accent1"/>
+            </a:lnRef>
+            <a:fillRef idx="3">
+              <a:schemeClr val="accent1"/>
+            </a:fillRef>
+            <a:effectRef idx="2">
+              <a:schemeClr val="accent1"/>
+            </a:effectRef>
+            <a:fontRef idx="minor">
+              <a:schemeClr val="lt1"/>
+            </a:fontRef>
+          </p:style>
+        </p:cxnSp>
+        <p:cxnSp>
+          <p:nvCxnSpPr>
+            <p:cNvPr id="26" name="Elbow Connector 14"/>
+            <p:cNvCxnSpPr>
+              <a:stCxn id="13" idx="0"/>
+              <a:endCxn id="10" idx="3"/>
+            </p:cNvCxnSpPr>
+            <p:nvPr/>
+          </p:nvCxnSpPr>
+          <p:spPr>
+            <a:xfrm rot="16200000" flipV="1">
+              <a:off x="5029200" y="4457700"/>
+              <a:ext cx="723900" cy="723900"/>
+            </a:xfrm>
+            <a:prstGeom prst="bentConnector2">
+              <a:avLst/>
+            </a:prstGeom>
+            <a:ln>
+              <a:tailEnd type="arrow"/>
+            </a:ln>
+          </p:spPr>
+          <p:style>
+            <a:lnRef idx="1">
+              <a:schemeClr val="accent1"/>
+            </a:lnRef>
+            <a:fillRef idx="3">
+              <a:schemeClr val="accent1"/>
+            </a:fillRef>
+            <a:effectRef idx="2">
+              <a:schemeClr val="accent1"/>
+            </a:effectRef>
+            <a:fontRef idx="minor">
+              <a:schemeClr val="lt1"/>
+            </a:fontRef>
+          </p:style>
+        </p:cxnSp>
+        <p:cxnSp>
+          <p:nvCxnSpPr>
+            <p:cNvPr id="27" name="Elbow Connector 14"/>
+            <p:cNvCxnSpPr>
+              <a:stCxn id="11" idx="2"/>
+              <a:endCxn id="10" idx="3"/>
+            </p:cNvCxnSpPr>
+            <p:nvPr/>
+          </p:nvCxnSpPr>
+          <p:spPr>
+            <a:xfrm rot="5400000">
+              <a:off x="4991100" y="3848100"/>
+              <a:ext cx="647700" cy="571500"/>
+            </a:xfrm>
+            <a:prstGeom prst="bentConnector2">
+              <a:avLst/>
+            </a:prstGeom>
+            <a:ln>
+              <a:tailEnd type="arrow"/>
+            </a:ln>
+          </p:spPr>
+          <p:style>
+            <a:lnRef idx="1">
+              <a:schemeClr val="accent1"/>
+            </a:lnRef>
+            <a:fillRef idx="3">
+              <a:schemeClr val="accent1"/>
+            </a:fillRef>
+            <a:effectRef idx="2">
+              <a:schemeClr val="accent1"/>
+            </a:effectRef>
+            <a:fontRef idx="minor">
+              <a:schemeClr val="lt1"/>
+            </a:fontRef>
+          </p:style>
+        </p:cxnSp>
+        <p:cxnSp>
+          <p:nvCxnSpPr>
+            <p:cNvPr id="28" name="Elbow Connector 14"/>
+            <p:cNvCxnSpPr>
+              <a:stCxn id="14" idx="0"/>
+              <a:endCxn id="11" idx="3"/>
+            </p:cNvCxnSpPr>
+            <p:nvPr/>
+          </p:nvCxnSpPr>
+          <p:spPr>
+            <a:xfrm rot="16200000" flipV="1">
+              <a:off x="6096000" y="3543300"/>
+              <a:ext cx="647700" cy="647700"/>
+            </a:xfrm>
+            <a:prstGeom prst="bentConnector2">
+              <a:avLst/>
+            </a:prstGeom>
+            <a:ln>
+              <a:tailEnd type="arrow"/>
+            </a:ln>
+          </p:spPr>
+          <p:style>
+            <a:lnRef idx="1">
+              <a:schemeClr val="accent1"/>
+            </a:lnRef>
+            <a:fillRef idx="3">
+              <a:schemeClr val="accent1"/>
+            </a:fillRef>
+            <a:effectRef idx="2">
+              <a:schemeClr val="accent1"/>
+            </a:effectRef>
+            <a:fontRef idx="minor">
+              <a:schemeClr val="lt1"/>
+            </a:fontRef>
+          </p:style>
+        </p:cxnSp>
+        <p:cxnSp>
+          <p:nvCxnSpPr>
+            <p:cNvPr id="29" name="Elbow Connector 14"/>
+            <p:cNvCxnSpPr>
+              <a:stCxn id="13" idx="3"/>
+              <a:endCxn id="14" idx="2"/>
+            </p:cNvCxnSpPr>
+            <p:nvPr/>
+          </p:nvCxnSpPr>
+          <p:spPr>
+            <a:xfrm flipV="1">
+              <a:off x="6248400" y="4724400"/>
+              <a:ext cx="495300" cy="723900"/>
+            </a:xfrm>
+            <a:prstGeom prst="bentConnector2">
+              <a:avLst/>
+            </a:prstGeom>
+            <a:ln>
+              <a:tailEnd type="arrow"/>
+            </a:ln>
+          </p:spPr>
+          <p:style>
+            <a:lnRef idx="1">
+              <a:schemeClr val="accent1"/>
+            </a:lnRef>
+            <a:fillRef idx="3">
+              <a:schemeClr val="accent1"/>
+            </a:fillRef>
+            <a:effectRef idx="2">
+              <a:schemeClr val="accent1"/>
+            </a:effectRef>
+            <a:fontRef idx="minor">
+              <a:schemeClr val="lt1"/>
+            </a:fontRef>
+          </p:style>
+        </p:cxnSp>
+        <p:cxnSp>
+          <p:nvCxnSpPr>
+            <p:cNvPr id="30" name="Elbow Connector 14"/>
+            <p:cNvCxnSpPr>
+              <a:stCxn id="14" idx="1"/>
+              <a:endCxn id="10" idx="3"/>
+            </p:cNvCxnSpPr>
+            <p:nvPr/>
+          </p:nvCxnSpPr>
+          <p:spPr>
+            <a:xfrm rot="10800000">
+              <a:off x="5029200" y="4457700"/>
+              <a:ext cx="1219200" cy="1588"/>
+            </a:xfrm>
+            <a:prstGeom prst="bentConnector3">
+              <a:avLst>
+                <a:gd name="adj1" fmla="val 50000"/>
+              </a:avLst>
+            </a:prstGeom>
+            <a:ln>
+              <a:tailEnd type="arrow"/>
+            </a:ln>
+          </p:spPr>
+          <p:style>
+            <a:lnRef idx="1">
+              <a:schemeClr val="accent1"/>
+            </a:lnRef>
+            <a:fillRef idx="3">
+              <a:schemeClr val="accent1"/>
+            </a:fillRef>
+            <a:effectRef idx="2">
+              <a:schemeClr val="accent1"/>
+            </a:effectRef>
+            <a:fontRef idx="minor">
+              <a:schemeClr val="lt1"/>
+            </a:fontRef>
+          </p:style>
+        </p:cxnSp>
+        <p:cxnSp>
+          <p:nvCxnSpPr>
+            <p:cNvPr id="31" name="Elbow Connector 14"/>
+            <p:cNvCxnSpPr>
+              <a:stCxn id="14" idx="0"/>
+              <a:endCxn id="7" idx="0"/>
+            </p:cNvCxnSpPr>
+            <p:nvPr/>
+          </p:nvCxnSpPr>
+          <p:spPr>
+            <a:xfrm rot="16200000" flipV="1">
+              <a:off x="4686300" y="2133600"/>
+              <a:ext cx="1066800" cy="3048000"/>
+            </a:xfrm>
+            <a:prstGeom prst="bentConnector3">
+              <a:avLst>
+                <a:gd name="adj1" fmla="val 121429"/>
+              </a:avLst>
+            </a:prstGeom>
+            <a:ln>
+              <a:tailEnd type="arrow"/>
+            </a:ln>
+          </p:spPr>
+          <p:style>
+            <a:lnRef idx="1">
+              <a:schemeClr val="accent1"/>
+            </a:lnRef>
+            <a:fillRef idx="3">
+              <a:schemeClr val="accent1"/>
+            </a:fillRef>
+            <a:effectRef idx="2">
+              <a:schemeClr val="accent1"/>
+            </a:effectRef>
+            <a:fontRef idx="minor">
+              <a:schemeClr val="lt1"/>
+            </a:fontRef>
+          </p:style>
+        </p:cxnSp>
+        <p:cxnSp>
+          <p:nvCxnSpPr>
+            <p:cNvPr id="32" name="Elbow Connector 14"/>
+            <p:cNvCxnSpPr>
+              <a:stCxn id="9" idx="2"/>
+              <a:endCxn id="12" idx="2"/>
+            </p:cNvCxnSpPr>
+            <p:nvPr/>
+          </p:nvCxnSpPr>
+          <p:spPr>
+            <a:xfrm rot="5400000" flipH="1">
+              <a:off x="1905000" y="3924300"/>
+              <a:ext cx="1143000" cy="2743200"/>
+            </a:xfrm>
+            <a:prstGeom prst="bentConnector3">
+              <a:avLst>
+                <a:gd name="adj1" fmla="val -20000"/>
+              </a:avLst>
+            </a:prstGeom>
+            <a:ln>
+              <a:tailEnd type="arrow"/>
+            </a:ln>
+          </p:spPr>
+          <p:style>
+            <a:lnRef idx="1">
+              <a:schemeClr val="accent1"/>
+            </a:lnRef>
+            <a:fillRef idx="3">
+              <a:schemeClr val="accent1"/>
+            </a:fillRef>
+            <a:effectRef idx="2">
+              <a:schemeClr val="accent1"/>
+            </a:effectRef>
+            <a:fontRef idx="minor">
+              <a:schemeClr val="lt1"/>
+            </a:fontRef>
+          </p:style>
+        </p:cxnSp>
+        <p:cxnSp>
+          <p:nvCxnSpPr>
+            <p:cNvPr id="33" name="Elbow Connector 14"/>
+            <p:cNvCxnSpPr>
+              <a:stCxn id="9" idx="2"/>
+              <a:endCxn id="13" idx="2"/>
+            </p:cNvCxnSpPr>
+            <p:nvPr/>
+          </p:nvCxnSpPr>
+          <p:spPr>
+            <a:xfrm rot="5400000" flipH="1" flipV="1">
+              <a:off x="4724400" y="4838700"/>
+              <a:ext cx="152400" cy="1905000"/>
+            </a:xfrm>
+            <a:prstGeom prst="bentConnector3">
+              <a:avLst>
+                <a:gd name="adj1" fmla="val -150000"/>
+              </a:avLst>
+            </a:prstGeom>
+            <a:ln>
+              <a:tailEnd type="arrow"/>
+            </a:ln>
+          </p:spPr>
+          <p:style>
+            <a:lnRef idx="1">
+              <a:schemeClr val="accent1"/>
+            </a:lnRef>
+            <a:fillRef idx="3">
+              <a:schemeClr val="accent1"/>
+            </a:fillRef>
+            <a:effectRef idx="2">
+              <a:schemeClr val="accent1"/>
+            </a:effectRef>
+            <a:fontRef idx="minor">
+              <a:schemeClr val="lt1"/>
+            </a:fontRef>
+          </p:style>
+        </p:cxnSp>
+        <p:cxnSp>
+          <p:nvCxnSpPr>
+            <p:cNvPr id="34" name="Elbow Connector 14"/>
+            <p:cNvCxnSpPr>
+              <a:stCxn id="13" idx="1"/>
+              <a:endCxn id="9" idx="3"/>
+            </p:cNvCxnSpPr>
+            <p:nvPr/>
+          </p:nvCxnSpPr>
+          <p:spPr>
+            <a:xfrm rot="10800000" flipV="1">
+              <a:off x="4343400" y="5448300"/>
+              <a:ext cx="914400" cy="152400"/>
+            </a:xfrm>
+            <a:prstGeom prst="bentConnector3">
+              <a:avLst>
+                <a:gd name="adj1" fmla="val 50000"/>
+              </a:avLst>
+            </a:prstGeom>
+            <a:ln>
+              <a:tailEnd type="arrow"/>
+            </a:ln>
+          </p:spPr>
+          <p:style>
+            <a:lnRef idx="1">
+              <a:schemeClr val="accent1"/>
+            </a:lnRef>
+            <a:fillRef idx="3">
+              <a:schemeClr val="accent1"/>
+            </a:fillRef>
+            <a:effectRef idx="2">
+              <a:schemeClr val="accent1"/>
+            </a:effectRef>
+            <a:fontRef idx="minor">
+              <a:schemeClr val="lt1"/>
+            </a:fontRef>
+          </p:style>
+        </p:cxnSp>
+        <p:cxnSp>
+          <p:nvCxnSpPr>
+            <p:cNvPr id="35" name="Elbow Connector 14"/>
+            <p:cNvCxnSpPr>
+              <a:stCxn id="14" idx="3"/>
+              <a:endCxn id="13" idx="2"/>
+            </p:cNvCxnSpPr>
+            <p:nvPr/>
+          </p:nvCxnSpPr>
+          <p:spPr>
+            <a:xfrm flipH="1">
+              <a:off x="5753100" y="4457700"/>
+              <a:ext cx="1485900" cy="1257300"/>
+            </a:xfrm>
+            <a:prstGeom prst="bentConnector4">
+              <a:avLst>
+                <a:gd name="adj1" fmla="val -15385"/>
+                <a:gd name="adj2" fmla="val 118182"/>
+              </a:avLst>
+            </a:prstGeom>
+            <a:ln>
+              <a:tailEnd type="arrow"/>
+            </a:ln>
+          </p:spPr>
+          <p:style>
+            <a:lnRef idx="1">
+              <a:schemeClr val="accent1"/>
+            </a:lnRef>
+            <a:fillRef idx="3">
+              <a:schemeClr val="accent1"/>
+            </a:fillRef>
+            <a:effectRef idx="2">
+              <a:schemeClr val="accent1"/>
+            </a:effectRef>
+            <a:fontRef idx="minor">
+              <a:schemeClr val="lt1"/>
+            </a:fontRef>
+          </p:style>
+        </p:cxnSp>
+        <p:cxnSp>
+          <p:nvCxnSpPr>
+            <p:cNvPr id="36" name="Elbow Connector 14"/>
+            <p:cNvCxnSpPr>
+              <a:stCxn id="11" idx="1"/>
+              <a:endCxn id="7" idx="3"/>
+            </p:cNvCxnSpPr>
+            <p:nvPr/>
+          </p:nvCxnSpPr>
+          <p:spPr>
+            <a:xfrm rot="10800000">
+              <a:off x="4191000" y="3390900"/>
+              <a:ext cx="914400" cy="152400"/>
+            </a:xfrm>
+            <a:prstGeom prst="bentConnector3">
+              <a:avLst>
+                <a:gd name="adj1" fmla="val 50000"/>
+              </a:avLst>
+            </a:prstGeom>
+            <a:ln>
+              <a:tailEnd type="arrow"/>
+            </a:ln>
+          </p:spPr>
+          <p:style>
+            <a:lnRef idx="1">
+              <a:schemeClr val="accent1"/>
+            </a:lnRef>
+            <a:fillRef idx="3">
+              <a:schemeClr val="accent1"/>
+            </a:fillRef>
+            <a:effectRef idx="2">
+              <a:schemeClr val="accent1"/>
+            </a:effectRef>
+            <a:fontRef idx="minor">
+              <a:schemeClr val="lt1"/>
+            </a:fontRef>
+          </p:style>
+        </p:cxnSp>
+        <p:cxnSp>
+          <p:nvCxnSpPr>
+            <p:cNvPr id="37" name="Elbow Connector 14"/>
+            <p:cNvCxnSpPr>
+              <a:stCxn id="5" idx="0"/>
+              <a:endCxn id="11" idx="0"/>
+            </p:cNvCxnSpPr>
+            <p:nvPr/>
+          </p:nvCxnSpPr>
+          <p:spPr>
+            <a:xfrm rot="5400000" flipH="1" flipV="1">
+              <a:off x="3771900" y="1524000"/>
+              <a:ext cx="76200" cy="3581400"/>
+            </a:xfrm>
+            <a:prstGeom prst="bentConnector3">
+              <a:avLst>
+                <a:gd name="adj1" fmla="val 481554"/>
+              </a:avLst>
+            </a:prstGeom>
+            <a:ln>
+              <a:tailEnd type="arrow"/>
+            </a:ln>
+          </p:spPr>
+          <p:style>
+            <a:lnRef idx="1">
+              <a:schemeClr val="accent1"/>
+            </a:lnRef>
+            <a:fillRef idx="3">
+              <a:schemeClr val="accent1"/>
+            </a:fillRef>
+            <a:effectRef idx="2">
+              <a:schemeClr val="accent1"/>
+            </a:effectRef>
+            <a:fontRef idx="minor">
+              <a:schemeClr val="lt1"/>
+            </a:fontRef>
+          </p:style>
+        </p:cxnSp>
+        <p:cxnSp>
+          <p:nvCxnSpPr>
+            <p:cNvPr id="38" name="Elbow Connector 14"/>
+            <p:cNvCxnSpPr>
+              <a:stCxn id="7" idx="0"/>
+              <a:endCxn id="12" idx="1"/>
+            </p:cNvCxnSpPr>
+            <p:nvPr/>
+          </p:nvCxnSpPr>
+          <p:spPr>
+            <a:xfrm rot="16200000" flipH="1" flipV="1">
+              <a:off x="1485900" y="2247900"/>
+              <a:ext cx="1333500" cy="3086100"/>
+            </a:xfrm>
+            <a:prstGeom prst="bentConnector4">
+              <a:avLst>
+                <a:gd name="adj1" fmla="val -17143"/>
+                <a:gd name="adj2" fmla="val 107407"/>
+              </a:avLst>
+            </a:prstGeom>
+            <a:ln>
+              <a:tailEnd type="arrow"/>
+            </a:ln>
+          </p:spPr>
+          <p:style>
+            <a:lnRef idx="1">
+              <a:schemeClr val="accent1"/>
+            </a:lnRef>
+            <a:fillRef idx="3">
+              <a:schemeClr val="accent1"/>
+            </a:fillRef>
+            <a:effectRef idx="2">
+              <a:schemeClr val="accent1"/>
+            </a:effectRef>
+            <a:fontRef idx="minor">
+              <a:schemeClr val="lt1"/>
+            </a:fontRef>
+          </p:style>
+        </p:cxnSp>
+      </p:grpSp>
     </p:spTree>
   </p:cSld>
   <p:clrMapOvr>
@@ -12382,7 +13639,7 @@
               <a:pPr algn="ctr"/>
               <a:r>
                 <a:rPr lang="en-US" sz="1200" dirty="0" smtClean="0"/>
-                <a:t>Service</a:t>
+                <a:t>Sender</a:t>
               </a:r>
               <a:endParaRPr lang="en-US" sz="1200" dirty="0"/>
             </a:p>
@@ -13473,7 +14730,7 @@
               <a:pPr algn="ctr"/>
               <a:r>
                 <a:rPr lang="en-US" sz="1200" dirty="0" smtClean="0"/>
-                <a:t>Service</a:t>
+                <a:t>Sender</a:t>
               </a:r>
               <a:endParaRPr lang="en-US" sz="1200" dirty="0"/>
             </a:p>
@@ -14415,7 +15672,7 @@
               <a:pPr algn="ctr"/>
               <a:r>
                 <a:rPr lang="en-US" sz="1200" dirty="0" smtClean="0"/>
-                <a:t>Service</a:t>
+                <a:t>Sender</a:t>
               </a:r>
               <a:endParaRPr lang="en-US" sz="1200" dirty="0"/>
             </a:p>
@@ -15754,15 +17011,7 @@
                   <a:schemeClr val="bg1"/>
                 </a:solidFill>
               </a:rPr>
-              <a:t>by Robert (Uncle Bob) Martin and Micah </a:t>
-            </a:r>
-            <a:r>
-              <a:rPr lang="en-US" sz="2000" dirty="0" smtClean="0">
-                <a:solidFill>
-                  <a:schemeClr val="bg1"/>
-                </a:solidFill>
-              </a:rPr>
-              <a:t>Martin</a:t>
+              <a:t>by Robert (Uncle Bob) Martin and Micah Martin</a:t>
             </a:r>
             <a:endParaRPr lang="en-US" sz="1000" dirty="0" smtClean="0">
               <a:solidFill>
@@ -15798,11 +17047,6 @@
               </a:rPr>
               <a:t>Pablo’s SOLID E-Book</a:t>
             </a:r>
-            <a:endParaRPr lang="en-US" sz="2000" dirty="0" smtClean="0">
-              <a:solidFill>
-                <a:schemeClr val="bg1"/>
-              </a:solidFill>
-            </a:endParaRPr>
           </a:p>
           <a:p>
             <a:pPr lvl="1" eaLnBrk="1" hangingPunct="1">
@@ -15835,11 +17079,6 @@
               </a:rPr>
               <a:t>	</a:t>
             </a:r>
-            <a:endParaRPr lang="en-US" sz="2000" dirty="0" smtClean="0">
-              <a:solidFill>
-                <a:schemeClr val="bg1"/>
-              </a:solidFill>
-            </a:endParaRPr>
           </a:p>
         </p:txBody>
       </p:sp>
@@ -16045,7 +17284,7 @@
         <p:spPr>
           <a:xfrm>
             <a:off x="685800" y="1066800"/>
-            <a:ext cx="8229600" cy="1295400"/>
+            <a:ext cx="8229600" cy="1219200"/>
           </a:xfrm>
         </p:spPr>
         <p:txBody>
@@ -16057,7 +17296,7 @@
             </a:pPr>
             <a:r>
               <a:rPr lang="en-US" dirty="0" smtClean="0"/>
-              <a:t>Coupling:</a:t>
+              <a:t>Cohesion:</a:t>
             </a:r>
           </a:p>
           <a:p>
@@ -16066,7 +17305,7 @@
             </a:pPr>
             <a:r>
               <a:rPr lang="en-US" sz="2000" dirty="0" smtClean="0"/>
-              <a:t>“The degree to which each program module relies on each one of the other modules” – </a:t>
+              <a:t>“A measure of how strongly-related and focused the various responsibilities of a software module are” - </a:t>
             </a:r>
             <a:r>
               <a:rPr lang="en-US" sz="2000" dirty="0" smtClean="0">
@@ -16074,6 +17313,7 @@
               </a:rPr>
               <a:t>Wikipedia</a:t>
             </a:r>
+            <a:endParaRPr lang="en-US" sz="2000" dirty="0" smtClean="0"/>
           </a:p>
         </p:txBody>
       </p:sp>
@@ -16111,1297 +17351,39 @@
           </a:p>
         </p:txBody>
       </p:sp>
-      <p:grpSp>
-        <p:nvGrpSpPr>
-          <p:cNvPr id="4" name="Group 3"/>
-          <p:cNvGrpSpPr/>
+      <p:pic>
+        <p:nvPicPr>
+          <p:cNvPr id="1026" name="Picture 2"/>
+          <p:cNvPicPr>
+            <a:picLocks noChangeAspect="1" noChangeArrowheads="1"/>
+          </p:cNvPicPr>
           <p:nvPr/>
-        </p:nvGrpSpPr>
-        <p:grpSpPr>
+        </p:nvPicPr>
+        <p:blipFill>
+          <a:blip r:embed="rId4"/>
+          <a:srcRect/>
+          <a:stretch>
+            <a:fillRect/>
+          </a:stretch>
+        </p:blipFill>
+        <p:spPr bwMode="auto">
           <a:xfrm>
-            <a:off x="1257300" y="2971800"/>
-            <a:ext cx="6629400" cy="2743200"/>
-            <a:chOff x="609600" y="3124200"/>
-            <a:chExt cx="6629400" cy="2743200"/>
+            <a:off x="2428875" y="2762250"/>
+            <a:ext cx="4286250" cy="3333750"/>
           </a:xfrm>
-          <a:scene3d>
-            <a:camera prst="perspectiveAbove"/>
-            <a:lightRig rig="threePt" dir="t"/>
-          </a:scene3d>
-        </p:grpSpPr>
-        <p:sp>
-          <p:nvSpPr>
-            <p:cNvPr id="5" name="Rectangle 4"/>
-            <p:cNvSpPr/>
-            <p:nvPr/>
-          </p:nvSpPr>
-          <p:spPr>
-            <a:xfrm>
-              <a:off x="1524000" y="3352800"/>
-              <a:ext cx="990600" cy="533400"/>
-            </a:xfrm>
-            <a:prstGeom prst="rect">
-              <a:avLst/>
-            </a:prstGeom>
-          </p:spPr>
-          <p:style>
-            <a:lnRef idx="1">
-              <a:schemeClr val="accent1"/>
-            </a:lnRef>
-            <a:fillRef idx="3">
-              <a:schemeClr val="accent1"/>
-            </a:fillRef>
-            <a:effectRef idx="2">
-              <a:schemeClr val="accent1"/>
-            </a:effectRef>
-            <a:fontRef idx="minor">
-              <a:schemeClr val="lt1"/>
-            </a:fontRef>
-          </p:style>
-          <p:txBody>
-            <a:bodyPr rtlCol="0" anchor="ctr"/>
-            <a:lstStyle/>
-            <a:p>
-              <a:pPr algn="ctr"/>
-              <a:endParaRPr lang="en-US"/>
-            </a:p>
-          </p:txBody>
-        </p:sp>
-        <p:sp>
-          <p:nvSpPr>
-            <p:cNvPr id="6" name="Rectangle 5"/>
-            <p:cNvSpPr/>
-            <p:nvPr/>
-          </p:nvSpPr>
-          <p:spPr>
-            <a:xfrm>
-              <a:off x="2667000" y="4495800"/>
-              <a:ext cx="990600" cy="533400"/>
-            </a:xfrm>
-            <a:prstGeom prst="rect">
-              <a:avLst/>
-            </a:prstGeom>
-          </p:spPr>
-          <p:style>
-            <a:lnRef idx="1">
-              <a:schemeClr val="accent2"/>
-            </a:lnRef>
-            <a:fillRef idx="3">
-              <a:schemeClr val="accent2"/>
-            </a:fillRef>
-            <a:effectRef idx="2">
-              <a:schemeClr val="accent2"/>
-            </a:effectRef>
-            <a:fontRef idx="minor">
-              <a:schemeClr val="lt1"/>
-            </a:fontRef>
-          </p:style>
-          <p:txBody>
-            <a:bodyPr rtlCol="0" anchor="ctr"/>
-            <a:lstStyle/>
-            <a:p>
-              <a:pPr algn="ctr"/>
-              <a:endParaRPr lang="en-US"/>
-            </a:p>
-          </p:txBody>
-        </p:sp>
-        <p:sp>
-          <p:nvSpPr>
-            <p:cNvPr id="7" name="Rectangle 6"/>
-            <p:cNvSpPr/>
-            <p:nvPr/>
-          </p:nvSpPr>
-          <p:spPr>
-            <a:xfrm>
-              <a:off x="3200400" y="3124200"/>
-              <a:ext cx="990600" cy="533400"/>
-            </a:xfrm>
-            <a:prstGeom prst="rect">
-              <a:avLst/>
-            </a:prstGeom>
-          </p:spPr>
-          <p:style>
-            <a:lnRef idx="1">
-              <a:schemeClr val="accent1"/>
-            </a:lnRef>
-            <a:fillRef idx="3">
-              <a:schemeClr val="accent1"/>
-            </a:fillRef>
-            <a:effectRef idx="2">
-              <a:schemeClr val="accent1"/>
-            </a:effectRef>
-            <a:fontRef idx="minor">
-              <a:schemeClr val="lt1"/>
-            </a:fontRef>
-          </p:style>
-          <p:txBody>
-            <a:bodyPr rtlCol="0" anchor="ctr"/>
-            <a:lstStyle/>
-            <a:p>
-              <a:pPr algn="ctr"/>
-              <a:endParaRPr lang="en-US"/>
-            </a:p>
-          </p:txBody>
-        </p:sp>
-        <p:sp>
-          <p:nvSpPr>
-            <p:cNvPr id="8" name="Rectangle 7"/>
-            <p:cNvSpPr/>
-            <p:nvPr/>
-          </p:nvSpPr>
-          <p:spPr>
-            <a:xfrm>
-              <a:off x="1447800" y="5181600"/>
-              <a:ext cx="990600" cy="533400"/>
-            </a:xfrm>
-            <a:prstGeom prst="rect">
-              <a:avLst/>
-            </a:prstGeom>
-          </p:spPr>
-          <p:style>
-            <a:lnRef idx="1">
-              <a:schemeClr val="accent1"/>
-            </a:lnRef>
-            <a:fillRef idx="3">
-              <a:schemeClr val="accent1"/>
-            </a:fillRef>
-            <a:effectRef idx="2">
-              <a:schemeClr val="accent1"/>
-            </a:effectRef>
-            <a:fontRef idx="minor">
-              <a:schemeClr val="lt1"/>
-            </a:fontRef>
-          </p:style>
-          <p:txBody>
-            <a:bodyPr rtlCol="0" anchor="ctr"/>
-            <a:lstStyle/>
-            <a:p>
-              <a:pPr algn="ctr"/>
-              <a:endParaRPr lang="en-US"/>
-            </a:p>
-          </p:txBody>
-        </p:sp>
-        <p:sp>
-          <p:nvSpPr>
-            <p:cNvPr id="9" name="Rectangle 8"/>
-            <p:cNvSpPr/>
-            <p:nvPr/>
-          </p:nvSpPr>
-          <p:spPr>
-            <a:xfrm>
-              <a:off x="3352800" y="5334000"/>
-              <a:ext cx="990600" cy="533400"/>
-            </a:xfrm>
-            <a:prstGeom prst="rect">
-              <a:avLst/>
-            </a:prstGeom>
-          </p:spPr>
-          <p:style>
-            <a:lnRef idx="1">
-              <a:schemeClr val="accent1"/>
-            </a:lnRef>
-            <a:fillRef idx="3">
-              <a:schemeClr val="accent1"/>
-            </a:fillRef>
-            <a:effectRef idx="2">
-              <a:schemeClr val="accent1"/>
-            </a:effectRef>
-            <a:fontRef idx="minor">
-              <a:schemeClr val="lt1"/>
-            </a:fontRef>
-          </p:style>
-          <p:txBody>
-            <a:bodyPr rtlCol="0" anchor="ctr"/>
-            <a:lstStyle/>
-            <a:p>
-              <a:pPr algn="ctr"/>
-              <a:endParaRPr lang="en-US"/>
-            </a:p>
-          </p:txBody>
-        </p:sp>
-        <p:sp>
-          <p:nvSpPr>
-            <p:cNvPr id="10" name="Rectangle 9"/>
-            <p:cNvSpPr/>
-            <p:nvPr/>
-          </p:nvSpPr>
-          <p:spPr>
-            <a:xfrm>
-              <a:off x="4038600" y="4191000"/>
-              <a:ext cx="990600" cy="533400"/>
-            </a:xfrm>
-            <a:prstGeom prst="rect">
-              <a:avLst/>
-            </a:prstGeom>
-          </p:spPr>
-          <p:style>
-            <a:lnRef idx="1">
-              <a:schemeClr val="accent1"/>
-            </a:lnRef>
-            <a:fillRef idx="3">
-              <a:schemeClr val="accent1"/>
-            </a:fillRef>
-            <a:effectRef idx="2">
-              <a:schemeClr val="accent1"/>
-            </a:effectRef>
-            <a:fontRef idx="minor">
-              <a:schemeClr val="lt1"/>
-            </a:fontRef>
-          </p:style>
-          <p:txBody>
-            <a:bodyPr rtlCol="0" anchor="ctr"/>
-            <a:lstStyle/>
-            <a:p>
-              <a:pPr algn="ctr"/>
-              <a:endParaRPr lang="en-US"/>
-            </a:p>
-          </p:txBody>
-        </p:sp>
-        <p:sp>
-          <p:nvSpPr>
-            <p:cNvPr id="11" name="Rectangle 10"/>
-            <p:cNvSpPr/>
-            <p:nvPr/>
-          </p:nvSpPr>
-          <p:spPr>
-            <a:xfrm>
-              <a:off x="5105400" y="3276600"/>
-              <a:ext cx="990600" cy="533400"/>
-            </a:xfrm>
-            <a:prstGeom prst="rect">
-              <a:avLst/>
-            </a:prstGeom>
-          </p:spPr>
-          <p:style>
-            <a:lnRef idx="1">
-              <a:schemeClr val="accent1"/>
-            </a:lnRef>
-            <a:fillRef idx="3">
-              <a:schemeClr val="accent1"/>
-            </a:fillRef>
-            <a:effectRef idx="2">
-              <a:schemeClr val="accent1"/>
-            </a:effectRef>
-            <a:fontRef idx="minor">
-              <a:schemeClr val="lt1"/>
-            </a:fontRef>
-          </p:style>
-          <p:txBody>
-            <a:bodyPr rtlCol="0" anchor="ctr"/>
-            <a:lstStyle/>
-            <a:p>
-              <a:pPr algn="ctr"/>
-              <a:endParaRPr lang="en-US"/>
-            </a:p>
-          </p:txBody>
-        </p:sp>
-        <p:sp>
-          <p:nvSpPr>
-            <p:cNvPr id="12" name="Rectangle 11"/>
-            <p:cNvSpPr/>
-            <p:nvPr/>
-          </p:nvSpPr>
-          <p:spPr>
-            <a:xfrm>
-              <a:off x="609600" y="4191000"/>
-              <a:ext cx="990600" cy="533400"/>
-            </a:xfrm>
-            <a:prstGeom prst="rect">
-              <a:avLst/>
-            </a:prstGeom>
-          </p:spPr>
-          <p:style>
-            <a:lnRef idx="1">
-              <a:schemeClr val="accent1"/>
-            </a:lnRef>
-            <a:fillRef idx="3">
-              <a:schemeClr val="accent1"/>
-            </a:fillRef>
-            <a:effectRef idx="2">
-              <a:schemeClr val="accent1"/>
-            </a:effectRef>
-            <a:fontRef idx="minor">
-              <a:schemeClr val="lt1"/>
-            </a:fontRef>
-          </p:style>
-          <p:txBody>
-            <a:bodyPr rtlCol="0" anchor="ctr"/>
-            <a:lstStyle/>
-            <a:p>
-              <a:pPr algn="ctr"/>
-              <a:endParaRPr lang="en-US"/>
-            </a:p>
-          </p:txBody>
-        </p:sp>
-        <p:sp>
-          <p:nvSpPr>
-            <p:cNvPr id="13" name="Rectangle 12"/>
-            <p:cNvSpPr/>
-            <p:nvPr/>
-          </p:nvSpPr>
-          <p:spPr>
-            <a:xfrm>
-              <a:off x="5257800" y="5181600"/>
-              <a:ext cx="990600" cy="533400"/>
-            </a:xfrm>
-            <a:prstGeom prst="rect">
-              <a:avLst/>
-            </a:prstGeom>
-          </p:spPr>
-          <p:style>
-            <a:lnRef idx="1">
-              <a:schemeClr val="accent1"/>
-            </a:lnRef>
-            <a:fillRef idx="3">
-              <a:schemeClr val="accent1"/>
-            </a:fillRef>
-            <a:effectRef idx="2">
-              <a:schemeClr val="accent1"/>
-            </a:effectRef>
-            <a:fontRef idx="minor">
-              <a:schemeClr val="lt1"/>
-            </a:fontRef>
-          </p:style>
-          <p:txBody>
-            <a:bodyPr rtlCol="0" anchor="ctr"/>
-            <a:lstStyle/>
-            <a:p>
-              <a:pPr algn="ctr"/>
-              <a:endParaRPr lang="en-US"/>
-            </a:p>
-          </p:txBody>
-        </p:sp>
-        <p:sp>
-          <p:nvSpPr>
-            <p:cNvPr id="14" name="Rectangle 13"/>
-            <p:cNvSpPr/>
-            <p:nvPr/>
-          </p:nvSpPr>
-          <p:spPr>
-            <a:xfrm>
-              <a:off x="6248400" y="4191000"/>
-              <a:ext cx="990600" cy="533400"/>
-            </a:xfrm>
-            <a:prstGeom prst="rect">
-              <a:avLst/>
-            </a:prstGeom>
-          </p:spPr>
-          <p:style>
-            <a:lnRef idx="1">
-              <a:schemeClr val="accent1"/>
-            </a:lnRef>
-            <a:fillRef idx="3">
-              <a:schemeClr val="accent1"/>
-            </a:fillRef>
-            <a:effectRef idx="2">
-              <a:schemeClr val="accent1"/>
-            </a:effectRef>
-            <a:fontRef idx="minor">
-              <a:schemeClr val="lt1"/>
-            </a:fontRef>
-          </p:style>
-          <p:txBody>
-            <a:bodyPr rtlCol="0" anchor="ctr"/>
-            <a:lstStyle/>
-            <a:p>
-              <a:pPr algn="ctr"/>
-              <a:endParaRPr lang="en-US"/>
-            </a:p>
-          </p:txBody>
-        </p:sp>
-        <p:cxnSp>
-          <p:nvCxnSpPr>
-            <p:cNvPr id="15" name="Elbow Connector 14"/>
-            <p:cNvCxnSpPr>
-              <a:stCxn id="5" idx="3"/>
-              <a:endCxn id="6" idx="0"/>
-            </p:cNvCxnSpPr>
-            <p:nvPr/>
-          </p:nvCxnSpPr>
-          <p:spPr>
-            <a:xfrm>
-              <a:off x="2514600" y="3619500"/>
-              <a:ext cx="647700" cy="876300"/>
-            </a:xfrm>
-            <a:prstGeom prst="bentConnector2">
-              <a:avLst/>
-            </a:prstGeom>
-            <a:ln>
-              <a:tailEnd type="arrow"/>
-            </a:ln>
-          </p:spPr>
-          <p:style>
-            <a:lnRef idx="1">
-              <a:schemeClr val="accent1"/>
-            </a:lnRef>
-            <a:fillRef idx="3">
-              <a:schemeClr val="accent1"/>
-            </a:fillRef>
-            <a:effectRef idx="2">
-              <a:schemeClr val="accent1"/>
-            </a:effectRef>
-            <a:fontRef idx="minor">
-              <a:schemeClr val="lt1"/>
-            </a:fontRef>
-          </p:style>
-        </p:cxnSp>
-        <p:cxnSp>
-          <p:nvCxnSpPr>
-            <p:cNvPr id="16" name="Elbow Connector 14"/>
-            <p:cNvCxnSpPr>
-              <a:stCxn id="5" idx="1"/>
-              <a:endCxn id="12" idx="0"/>
-            </p:cNvCxnSpPr>
-            <p:nvPr/>
-          </p:nvCxnSpPr>
-          <p:spPr>
-            <a:xfrm rot="10800000" flipV="1">
-              <a:off x="1104900" y="3619500"/>
-              <a:ext cx="419100" cy="571500"/>
-            </a:xfrm>
-            <a:prstGeom prst="bentConnector2">
-              <a:avLst/>
-            </a:prstGeom>
-            <a:ln>
-              <a:tailEnd type="arrow"/>
-            </a:ln>
-          </p:spPr>
-          <p:style>
-            <a:lnRef idx="1">
-              <a:schemeClr val="accent1"/>
-            </a:lnRef>
-            <a:fillRef idx="3">
-              <a:schemeClr val="accent1"/>
-            </a:fillRef>
-            <a:effectRef idx="2">
-              <a:schemeClr val="accent1"/>
-            </a:effectRef>
-            <a:fontRef idx="minor">
-              <a:schemeClr val="lt1"/>
-            </a:fontRef>
-          </p:style>
-        </p:cxnSp>
-        <p:cxnSp>
-          <p:nvCxnSpPr>
-            <p:cNvPr id="17" name="Elbow Connector 14"/>
-            <p:cNvCxnSpPr>
-              <a:stCxn id="6" idx="1"/>
-              <a:endCxn id="5" idx="2"/>
-            </p:cNvCxnSpPr>
-            <p:nvPr/>
-          </p:nvCxnSpPr>
-          <p:spPr>
-            <a:xfrm rot="10800000">
-              <a:off x="2019300" y="3886200"/>
-              <a:ext cx="647700" cy="876300"/>
-            </a:xfrm>
-            <a:prstGeom prst="bentConnector2">
-              <a:avLst/>
-            </a:prstGeom>
-            <a:ln>
-              <a:tailEnd type="arrow"/>
-            </a:ln>
-          </p:spPr>
-          <p:style>
-            <a:lnRef idx="1">
-              <a:schemeClr val="accent1"/>
-            </a:lnRef>
-            <a:fillRef idx="3">
-              <a:schemeClr val="accent1"/>
-            </a:fillRef>
-            <a:effectRef idx="2">
-              <a:schemeClr val="accent1"/>
-            </a:effectRef>
-            <a:fontRef idx="minor">
-              <a:schemeClr val="lt1"/>
-            </a:fontRef>
-          </p:style>
-        </p:cxnSp>
-        <p:cxnSp>
-          <p:nvCxnSpPr>
-            <p:cNvPr id="18" name="Elbow Connector 14"/>
-            <p:cNvCxnSpPr>
-              <a:stCxn id="7" idx="2"/>
-              <a:endCxn id="6" idx="0"/>
-            </p:cNvCxnSpPr>
-            <p:nvPr/>
-          </p:nvCxnSpPr>
-          <p:spPr>
-            <a:xfrm rot="5400000">
-              <a:off x="3009900" y="3810000"/>
-              <a:ext cx="838200" cy="533400"/>
-            </a:xfrm>
-            <a:prstGeom prst="bentConnector3">
-              <a:avLst>
-                <a:gd name="adj1" fmla="val 50000"/>
-              </a:avLst>
-            </a:prstGeom>
-            <a:ln>
-              <a:tailEnd type="arrow"/>
-            </a:ln>
-          </p:spPr>
-          <p:style>
-            <a:lnRef idx="1">
-              <a:schemeClr val="accent1"/>
-            </a:lnRef>
-            <a:fillRef idx="3">
-              <a:schemeClr val="accent1"/>
-            </a:fillRef>
-            <a:effectRef idx="2">
-              <a:schemeClr val="accent1"/>
-            </a:effectRef>
-            <a:fontRef idx="minor">
-              <a:schemeClr val="lt1"/>
-            </a:fontRef>
-          </p:style>
-        </p:cxnSp>
-        <p:cxnSp>
-          <p:nvCxnSpPr>
-            <p:cNvPr id="19" name="Elbow Connector 14"/>
-            <p:cNvCxnSpPr>
-              <a:stCxn id="10" idx="0"/>
-              <a:endCxn id="7" idx="3"/>
-            </p:cNvCxnSpPr>
-            <p:nvPr/>
-          </p:nvCxnSpPr>
-          <p:spPr>
-            <a:xfrm rot="16200000" flipV="1">
-              <a:off x="3962400" y="3619500"/>
-              <a:ext cx="800100" cy="342900"/>
-            </a:xfrm>
-            <a:prstGeom prst="bentConnector2">
-              <a:avLst/>
-            </a:prstGeom>
-            <a:ln>
-              <a:tailEnd type="arrow"/>
-            </a:ln>
-          </p:spPr>
-          <p:style>
-            <a:lnRef idx="1">
-              <a:schemeClr val="accent1"/>
-            </a:lnRef>
-            <a:fillRef idx="3">
-              <a:schemeClr val="accent1"/>
-            </a:fillRef>
-            <a:effectRef idx="2">
-              <a:schemeClr val="accent1"/>
-            </a:effectRef>
-            <a:fontRef idx="minor">
-              <a:schemeClr val="lt1"/>
-            </a:fontRef>
-          </p:style>
-        </p:cxnSp>
-        <p:cxnSp>
-          <p:nvCxnSpPr>
-            <p:cNvPr id="20" name="Elbow Connector 14"/>
-            <p:cNvCxnSpPr>
-              <a:stCxn id="8" idx="3"/>
-              <a:endCxn id="9" idx="1"/>
-            </p:cNvCxnSpPr>
-            <p:nvPr/>
-          </p:nvCxnSpPr>
-          <p:spPr>
-            <a:xfrm>
-              <a:off x="2438400" y="5448300"/>
-              <a:ext cx="914400" cy="152400"/>
-            </a:xfrm>
-            <a:prstGeom prst="bentConnector3">
-              <a:avLst>
-                <a:gd name="adj1" fmla="val 50000"/>
-              </a:avLst>
-            </a:prstGeom>
-            <a:ln>
-              <a:tailEnd type="arrow"/>
-            </a:ln>
-          </p:spPr>
-          <p:style>
-            <a:lnRef idx="1">
-              <a:schemeClr val="accent1"/>
-            </a:lnRef>
-            <a:fillRef idx="3">
-              <a:schemeClr val="accent1"/>
-            </a:fillRef>
-            <a:effectRef idx="2">
-              <a:schemeClr val="accent1"/>
-            </a:effectRef>
-            <a:fontRef idx="minor">
-              <a:schemeClr val="lt1"/>
-            </a:fontRef>
-          </p:style>
-        </p:cxnSp>
-        <p:cxnSp>
-          <p:nvCxnSpPr>
-            <p:cNvPr id="21" name="Elbow Connector 14"/>
-            <p:cNvCxnSpPr>
-              <a:stCxn id="9" idx="0"/>
-              <a:endCxn id="6" idx="2"/>
-            </p:cNvCxnSpPr>
-            <p:nvPr/>
-          </p:nvCxnSpPr>
-          <p:spPr>
-            <a:xfrm rot="16200000" flipV="1">
-              <a:off x="3352800" y="4838700"/>
-              <a:ext cx="304800" cy="685800"/>
-            </a:xfrm>
-            <a:prstGeom prst="bentConnector3">
-              <a:avLst>
-                <a:gd name="adj1" fmla="val 50000"/>
-              </a:avLst>
-            </a:prstGeom>
-            <a:ln>
-              <a:tailEnd type="arrow"/>
-            </a:ln>
-          </p:spPr>
-          <p:style>
-            <a:lnRef idx="1">
-              <a:schemeClr val="accent1"/>
-            </a:lnRef>
-            <a:fillRef idx="3">
-              <a:schemeClr val="accent1"/>
-            </a:fillRef>
-            <a:effectRef idx="2">
-              <a:schemeClr val="accent1"/>
-            </a:effectRef>
-            <a:fontRef idx="minor">
-              <a:schemeClr val="lt1"/>
-            </a:fontRef>
-          </p:style>
-        </p:cxnSp>
-        <p:cxnSp>
-          <p:nvCxnSpPr>
-            <p:cNvPr id="22" name="Elbow Connector 14"/>
-            <p:cNvCxnSpPr>
-              <a:stCxn id="12" idx="3"/>
-              <a:endCxn id="8" idx="0"/>
-            </p:cNvCxnSpPr>
-            <p:nvPr/>
-          </p:nvCxnSpPr>
-          <p:spPr>
-            <a:xfrm>
-              <a:off x="1600200" y="4457700"/>
-              <a:ext cx="342900" cy="723900"/>
-            </a:xfrm>
-            <a:prstGeom prst="bentConnector2">
-              <a:avLst/>
-            </a:prstGeom>
-            <a:ln>
-              <a:tailEnd type="arrow"/>
-            </a:ln>
-          </p:spPr>
-          <p:style>
-            <a:lnRef idx="1">
-              <a:schemeClr val="accent1"/>
-            </a:lnRef>
-            <a:fillRef idx="3">
-              <a:schemeClr val="accent1"/>
-            </a:fillRef>
-            <a:effectRef idx="2">
-              <a:schemeClr val="accent1"/>
-            </a:effectRef>
-            <a:fontRef idx="minor">
-              <a:schemeClr val="lt1"/>
-            </a:fontRef>
-          </p:style>
-        </p:cxnSp>
-        <p:cxnSp>
-          <p:nvCxnSpPr>
-            <p:cNvPr id="23" name="Elbow Connector 14"/>
-            <p:cNvCxnSpPr>
-              <a:stCxn id="6" idx="1"/>
-              <a:endCxn id="8" idx="0"/>
-            </p:cNvCxnSpPr>
-            <p:nvPr/>
-          </p:nvCxnSpPr>
-          <p:spPr>
-            <a:xfrm rot="10800000" flipV="1">
-              <a:off x="1943100" y="4762500"/>
-              <a:ext cx="723900" cy="419100"/>
-            </a:xfrm>
-            <a:prstGeom prst="bentConnector2">
-              <a:avLst/>
-            </a:prstGeom>
-            <a:ln>
-              <a:tailEnd type="arrow"/>
-            </a:ln>
-          </p:spPr>
-          <p:style>
-            <a:lnRef idx="1">
-              <a:schemeClr val="accent1"/>
-            </a:lnRef>
-            <a:fillRef idx="3">
-              <a:schemeClr val="accent1"/>
-            </a:fillRef>
-            <a:effectRef idx="2">
-              <a:schemeClr val="accent1"/>
-            </a:effectRef>
-            <a:fontRef idx="minor">
-              <a:schemeClr val="lt1"/>
-            </a:fontRef>
-          </p:style>
-        </p:cxnSp>
-        <p:cxnSp>
-          <p:nvCxnSpPr>
-            <p:cNvPr id="24" name="Elbow Connector 14"/>
-            <p:cNvCxnSpPr>
-              <a:stCxn id="10" idx="1"/>
-              <a:endCxn id="6" idx="3"/>
-            </p:cNvCxnSpPr>
-            <p:nvPr/>
-          </p:nvCxnSpPr>
-          <p:spPr>
-            <a:xfrm rot="10800000" flipV="1">
-              <a:off x="3657600" y="4457700"/>
-              <a:ext cx="381000" cy="304800"/>
-            </a:xfrm>
-            <a:prstGeom prst="bentConnector3">
-              <a:avLst>
-                <a:gd name="adj1" fmla="val 50000"/>
-              </a:avLst>
-            </a:prstGeom>
-            <a:ln>
-              <a:tailEnd type="arrow"/>
-            </a:ln>
-          </p:spPr>
-          <p:style>
-            <a:lnRef idx="1">
-              <a:schemeClr val="accent1"/>
-            </a:lnRef>
-            <a:fillRef idx="3">
-              <a:schemeClr val="accent1"/>
-            </a:fillRef>
-            <a:effectRef idx="2">
-              <a:schemeClr val="accent1"/>
-            </a:effectRef>
-            <a:fontRef idx="minor">
-              <a:schemeClr val="lt1"/>
-            </a:fontRef>
-          </p:style>
-        </p:cxnSp>
-        <p:cxnSp>
-          <p:nvCxnSpPr>
-            <p:cNvPr id="25" name="Elbow Connector 14"/>
-            <p:cNvCxnSpPr>
-              <a:stCxn id="10" idx="2"/>
-              <a:endCxn id="9" idx="3"/>
-            </p:cNvCxnSpPr>
-            <p:nvPr/>
-          </p:nvCxnSpPr>
-          <p:spPr>
-            <a:xfrm rot="5400000">
-              <a:off x="4000500" y="5067300"/>
-              <a:ext cx="876300" cy="190500"/>
-            </a:xfrm>
-            <a:prstGeom prst="bentConnector2">
-              <a:avLst/>
-            </a:prstGeom>
-            <a:ln>
-              <a:tailEnd type="arrow"/>
-            </a:ln>
-          </p:spPr>
-          <p:style>
-            <a:lnRef idx="1">
-              <a:schemeClr val="accent1"/>
-            </a:lnRef>
-            <a:fillRef idx="3">
-              <a:schemeClr val="accent1"/>
-            </a:fillRef>
-            <a:effectRef idx="2">
-              <a:schemeClr val="accent1"/>
-            </a:effectRef>
-            <a:fontRef idx="minor">
-              <a:schemeClr val="lt1"/>
-            </a:fontRef>
-          </p:style>
-        </p:cxnSp>
-        <p:cxnSp>
-          <p:nvCxnSpPr>
-            <p:cNvPr id="26" name="Elbow Connector 14"/>
-            <p:cNvCxnSpPr>
-              <a:stCxn id="13" idx="0"/>
-              <a:endCxn id="10" idx="3"/>
-            </p:cNvCxnSpPr>
-            <p:nvPr/>
-          </p:nvCxnSpPr>
-          <p:spPr>
-            <a:xfrm rot="16200000" flipV="1">
-              <a:off x="5029200" y="4457700"/>
-              <a:ext cx="723900" cy="723900"/>
-            </a:xfrm>
-            <a:prstGeom prst="bentConnector2">
-              <a:avLst/>
-            </a:prstGeom>
-            <a:ln>
-              <a:tailEnd type="arrow"/>
-            </a:ln>
-          </p:spPr>
-          <p:style>
-            <a:lnRef idx="1">
-              <a:schemeClr val="accent1"/>
-            </a:lnRef>
-            <a:fillRef idx="3">
-              <a:schemeClr val="accent1"/>
-            </a:fillRef>
-            <a:effectRef idx="2">
-              <a:schemeClr val="accent1"/>
-            </a:effectRef>
-            <a:fontRef idx="minor">
-              <a:schemeClr val="lt1"/>
-            </a:fontRef>
-          </p:style>
-        </p:cxnSp>
-        <p:cxnSp>
-          <p:nvCxnSpPr>
-            <p:cNvPr id="27" name="Elbow Connector 14"/>
-            <p:cNvCxnSpPr>
-              <a:stCxn id="11" idx="2"/>
-              <a:endCxn id="10" idx="3"/>
-            </p:cNvCxnSpPr>
-            <p:nvPr/>
-          </p:nvCxnSpPr>
-          <p:spPr>
-            <a:xfrm rot="5400000">
-              <a:off x="4991100" y="3848100"/>
-              <a:ext cx="647700" cy="571500"/>
-            </a:xfrm>
-            <a:prstGeom prst="bentConnector2">
-              <a:avLst/>
-            </a:prstGeom>
-            <a:ln>
-              <a:tailEnd type="arrow"/>
-            </a:ln>
-          </p:spPr>
-          <p:style>
-            <a:lnRef idx="1">
-              <a:schemeClr val="accent1"/>
-            </a:lnRef>
-            <a:fillRef idx="3">
-              <a:schemeClr val="accent1"/>
-            </a:fillRef>
-            <a:effectRef idx="2">
-              <a:schemeClr val="accent1"/>
-            </a:effectRef>
-            <a:fontRef idx="minor">
-              <a:schemeClr val="lt1"/>
-            </a:fontRef>
-          </p:style>
-        </p:cxnSp>
-        <p:cxnSp>
-          <p:nvCxnSpPr>
-            <p:cNvPr id="28" name="Elbow Connector 14"/>
-            <p:cNvCxnSpPr>
-              <a:stCxn id="14" idx="0"/>
-              <a:endCxn id="11" idx="3"/>
-            </p:cNvCxnSpPr>
-            <p:nvPr/>
-          </p:nvCxnSpPr>
-          <p:spPr>
-            <a:xfrm rot="16200000" flipV="1">
-              <a:off x="6096000" y="3543300"/>
-              <a:ext cx="647700" cy="647700"/>
-            </a:xfrm>
-            <a:prstGeom prst="bentConnector2">
-              <a:avLst/>
-            </a:prstGeom>
-            <a:ln>
-              <a:tailEnd type="arrow"/>
-            </a:ln>
-          </p:spPr>
-          <p:style>
-            <a:lnRef idx="1">
-              <a:schemeClr val="accent1"/>
-            </a:lnRef>
-            <a:fillRef idx="3">
-              <a:schemeClr val="accent1"/>
-            </a:fillRef>
-            <a:effectRef idx="2">
-              <a:schemeClr val="accent1"/>
-            </a:effectRef>
-            <a:fontRef idx="minor">
-              <a:schemeClr val="lt1"/>
-            </a:fontRef>
-          </p:style>
-        </p:cxnSp>
-        <p:cxnSp>
-          <p:nvCxnSpPr>
-            <p:cNvPr id="29" name="Elbow Connector 14"/>
-            <p:cNvCxnSpPr>
-              <a:stCxn id="13" idx="3"/>
-              <a:endCxn id="14" idx="2"/>
-            </p:cNvCxnSpPr>
-            <p:nvPr/>
-          </p:nvCxnSpPr>
-          <p:spPr>
-            <a:xfrm flipV="1">
-              <a:off x="6248400" y="4724400"/>
-              <a:ext cx="495300" cy="723900"/>
-            </a:xfrm>
-            <a:prstGeom prst="bentConnector2">
-              <a:avLst/>
-            </a:prstGeom>
-            <a:ln>
-              <a:tailEnd type="arrow"/>
-            </a:ln>
-          </p:spPr>
-          <p:style>
-            <a:lnRef idx="1">
-              <a:schemeClr val="accent1"/>
-            </a:lnRef>
-            <a:fillRef idx="3">
-              <a:schemeClr val="accent1"/>
-            </a:fillRef>
-            <a:effectRef idx="2">
-              <a:schemeClr val="accent1"/>
-            </a:effectRef>
-            <a:fontRef idx="minor">
-              <a:schemeClr val="lt1"/>
-            </a:fontRef>
-          </p:style>
-        </p:cxnSp>
-        <p:cxnSp>
-          <p:nvCxnSpPr>
-            <p:cNvPr id="30" name="Elbow Connector 14"/>
-            <p:cNvCxnSpPr>
-              <a:stCxn id="14" idx="1"/>
-              <a:endCxn id="10" idx="3"/>
-            </p:cNvCxnSpPr>
-            <p:nvPr/>
-          </p:nvCxnSpPr>
-          <p:spPr>
-            <a:xfrm rot="10800000">
-              <a:off x="5029200" y="4457700"/>
-              <a:ext cx="1219200" cy="1588"/>
-            </a:xfrm>
-            <a:prstGeom prst="bentConnector3">
-              <a:avLst>
-                <a:gd name="adj1" fmla="val 50000"/>
-              </a:avLst>
-            </a:prstGeom>
-            <a:ln>
-              <a:tailEnd type="arrow"/>
-            </a:ln>
-          </p:spPr>
-          <p:style>
-            <a:lnRef idx="1">
-              <a:schemeClr val="accent1"/>
-            </a:lnRef>
-            <a:fillRef idx="3">
-              <a:schemeClr val="accent1"/>
-            </a:fillRef>
-            <a:effectRef idx="2">
-              <a:schemeClr val="accent1"/>
-            </a:effectRef>
-            <a:fontRef idx="minor">
-              <a:schemeClr val="lt1"/>
-            </a:fontRef>
-          </p:style>
-        </p:cxnSp>
-        <p:cxnSp>
-          <p:nvCxnSpPr>
-            <p:cNvPr id="31" name="Elbow Connector 14"/>
-            <p:cNvCxnSpPr>
-              <a:stCxn id="14" idx="0"/>
-              <a:endCxn id="7" idx="0"/>
-            </p:cNvCxnSpPr>
-            <p:nvPr/>
-          </p:nvCxnSpPr>
-          <p:spPr>
-            <a:xfrm rot="16200000" flipV="1">
-              <a:off x="4686300" y="2133600"/>
-              <a:ext cx="1066800" cy="3048000"/>
-            </a:xfrm>
-            <a:prstGeom prst="bentConnector3">
-              <a:avLst>
-                <a:gd name="adj1" fmla="val 121429"/>
-              </a:avLst>
-            </a:prstGeom>
-            <a:ln>
-              <a:tailEnd type="arrow"/>
-            </a:ln>
-          </p:spPr>
-          <p:style>
-            <a:lnRef idx="1">
-              <a:schemeClr val="accent1"/>
-            </a:lnRef>
-            <a:fillRef idx="3">
-              <a:schemeClr val="accent1"/>
-            </a:fillRef>
-            <a:effectRef idx="2">
-              <a:schemeClr val="accent1"/>
-            </a:effectRef>
-            <a:fontRef idx="minor">
-              <a:schemeClr val="lt1"/>
-            </a:fontRef>
-          </p:style>
-        </p:cxnSp>
-        <p:cxnSp>
-          <p:nvCxnSpPr>
-            <p:cNvPr id="32" name="Elbow Connector 14"/>
-            <p:cNvCxnSpPr>
-              <a:stCxn id="9" idx="2"/>
-              <a:endCxn id="12" idx="2"/>
-            </p:cNvCxnSpPr>
-            <p:nvPr/>
-          </p:nvCxnSpPr>
-          <p:spPr>
-            <a:xfrm rot="5400000" flipH="1">
-              <a:off x="1905000" y="3924300"/>
-              <a:ext cx="1143000" cy="2743200"/>
-            </a:xfrm>
-            <a:prstGeom prst="bentConnector3">
-              <a:avLst>
-                <a:gd name="adj1" fmla="val -20000"/>
-              </a:avLst>
-            </a:prstGeom>
-            <a:ln>
-              <a:tailEnd type="arrow"/>
-            </a:ln>
-          </p:spPr>
-          <p:style>
-            <a:lnRef idx="1">
-              <a:schemeClr val="accent1"/>
-            </a:lnRef>
-            <a:fillRef idx="3">
-              <a:schemeClr val="accent1"/>
-            </a:fillRef>
-            <a:effectRef idx="2">
-              <a:schemeClr val="accent1"/>
-            </a:effectRef>
-            <a:fontRef idx="minor">
-              <a:schemeClr val="lt1"/>
-            </a:fontRef>
-          </p:style>
-        </p:cxnSp>
-        <p:cxnSp>
-          <p:nvCxnSpPr>
-            <p:cNvPr id="33" name="Elbow Connector 14"/>
-            <p:cNvCxnSpPr>
-              <a:stCxn id="9" idx="2"/>
-              <a:endCxn id="13" idx="2"/>
-            </p:cNvCxnSpPr>
-            <p:nvPr/>
-          </p:nvCxnSpPr>
-          <p:spPr>
-            <a:xfrm rot="5400000" flipH="1" flipV="1">
-              <a:off x="4724400" y="4838700"/>
-              <a:ext cx="152400" cy="1905000"/>
-            </a:xfrm>
-            <a:prstGeom prst="bentConnector3">
-              <a:avLst>
-                <a:gd name="adj1" fmla="val -150000"/>
-              </a:avLst>
-            </a:prstGeom>
-            <a:ln>
-              <a:tailEnd type="arrow"/>
-            </a:ln>
-          </p:spPr>
-          <p:style>
-            <a:lnRef idx="1">
-              <a:schemeClr val="accent1"/>
-            </a:lnRef>
-            <a:fillRef idx="3">
-              <a:schemeClr val="accent1"/>
-            </a:fillRef>
-            <a:effectRef idx="2">
-              <a:schemeClr val="accent1"/>
-            </a:effectRef>
-            <a:fontRef idx="minor">
-              <a:schemeClr val="lt1"/>
-            </a:fontRef>
-          </p:style>
-        </p:cxnSp>
-        <p:cxnSp>
-          <p:nvCxnSpPr>
-            <p:cNvPr id="34" name="Elbow Connector 14"/>
-            <p:cNvCxnSpPr>
-              <a:stCxn id="13" idx="1"/>
-              <a:endCxn id="9" idx="3"/>
-            </p:cNvCxnSpPr>
-            <p:nvPr/>
-          </p:nvCxnSpPr>
-          <p:spPr>
-            <a:xfrm rot="10800000" flipV="1">
-              <a:off x="4343400" y="5448300"/>
-              <a:ext cx="914400" cy="152400"/>
-            </a:xfrm>
-            <a:prstGeom prst="bentConnector3">
-              <a:avLst>
-                <a:gd name="adj1" fmla="val 50000"/>
-              </a:avLst>
-            </a:prstGeom>
-            <a:ln>
-              <a:tailEnd type="arrow"/>
-            </a:ln>
-          </p:spPr>
-          <p:style>
-            <a:lnRef idx="1">
-              <a:schemeClr val="accent1"/>
-            </a:lnRef>
-            <a:fillRef idx="3">
-              <a:schemeClr val="accent1"/>
-            </a:fillRef>
-            <a:effectRef idx="2">
-              <a:schemeClr val="accent1"/>
-            </a:effectRef>
-            <a:fontRef idx="minor">
-              <a:schemeClr val="lt1"/>
-            </a:fontRef>
-          </p:style>
-        </p:cxnSp>
-        <p:cxnSp>
-          <p:nvCxnSpPr>
-            <p:cNvPr id="35" name="Elbow Connector 14"/>
-            <p:cNvCxnSpPr>
-              <a:stCxn id="14" idx="3"/>
-              <a:endCxn id="13" idx="2"/>
-            </p:cNvCxnSpPr>
-            <p:nvPr/>
-          </p:nvCxnSpPr>
-          <p:spPr>
-            <a:xfrm flipH="1">
-              <a:off x="5753100" y="4457700"/>
-              <a:ext cx="1485900" cy="1257300"/>
-            </a:xfrm>
-            <a:prstGeom prst="bentConnector4">
-              <a:avLst>
-                <a:gd name="adj1" fmla="val -15385"/>
-                <a:gd name="adj2" fmla="val 118182"/>
-              </a:avLst>
-            </a:prstGeom>
-            <a:ln>
-              <a:tailEnd type="arrow"/>
-            </a:ln>
-          </p:spPr>
-          <p:style>
-            <a:lnRef idx="1">
-              <a:schemeClr val="accent1"/>
-            </a:lnRef>
-            <a:fillRef idx="3">
-              <a:schemeClr val="accent1"/>
-            </a:fillRef>
-            <a:effectRef idx="2">
-              <a:schemeClr val="accent1"/>
-            </a:effectRef>
-            <a:fontRef idx="minor">
-              <a:schemeClr val="lt1"/>
-            </a:fontRef>
-          </p:style>
-        </p:cxnSp>
-        <p:cxnSp>
-          <p:nvCxnSpPr>
-            <p:cNvPr id="36" name="Elbow Connector 14"/>
-            <p:cNvCxnSpPr>
-              <a:stCxn id="11" idx="1"/>
-              <a:endCxn id="7" idx="3"/>
-            </p:cNvCxnSpPr>
-            <p:nvPr/>
-          </p:nvCxnSpPr>
-          <p:spPr>
-            <a:xfrm rot="10800000">
-              <a:off x="4191000" y="3390900"/>
-              <a:ext cx="914400" cy="152400"/>
-            </a:xfrm>
-            <a:prstGeom prst="bentConnector3">
-              <a:avLst>
-                <a:gd name="adj1" fmla="val 50000"/>
-              </a:avLst>
-            </a:prstGeom>
-            <a:ln>
-              <a:tailEnd type="arrow"/>
-            </a:ln>
-          </p:spPr>
-          <p:style>
-            <a:lnRef idx="1">
-              <a:schemeClr val="accent1"/>
-            </a:lnRef>
-            <a:fillRef idx="3">
-              <a:schemeClr val="accent1"/>
-            </a:fillRef>
-            <a:effectRef idx="2">
-              <a:schemeClr val="accent1"/>
-            </a:effectRef>
-            <a:fontRef idx="minor">
-              <a:schemeClr val="lt1"/>
-            </a:fontRef>
-          </p:style>
-        </p:cxnSp>
-        <p:cxnSp>
-          <p:nvCxnSpPr>
-            <p:cNvPr id="37" name="Elbow Connector 14"/>
-            <p:cNvCxnSpPr>
-              <a:stCxn id="5" idx="0"/>
-              <a:endCxn id="11" idx="0"/>
-            </p:cNvCxnSpPr>
-            <p:nvPr/>
-          </p:nvCxnSpPr>
-          <p:spPr>
-            <a:xfrm rot="5400000" flipH="1" flipV="1">
-              <a:off x="3771900" y="1524000"/>
-              <a:ext cx="76200" cy="3581400"/>
-            </a:xfrm>
-            <a:prstGeom prst="bentConnector3">
-              <a:avLst>
-                <a:gd name="adj1" fmla="val 481554"/>
-              </a:avLst>
-            </a:prstGeom>
-            <a:ln>
-              <a:tailEnd type="arrow"/>
-            </a:ln>
-          </p:spPr>
-          <p:style>
-            <a:lnRef idx="1">
-              <a:schemeClr val="accent1"/>
-            </a:lnRef>
-            <a:fillRef idx="3">
-              <a:schemeClr val="accent1"/>
-            </a:fillRef>
-            <a:effectRef idx="2">
-              <a:schemeClr val="accent1"/>
-            </a:effectRef>
-            <a:fontRef idx="minor">
-              <a:schemeClr val="lt1"/>
-            </a:fontRef>
-          </p:style>
-        </p:cxnSp>
-        <p:cxnSp>
-          <p:nvCxnSpPr>
-            <p:cNvPr id="38" name="Elbow Connector 14"/>
-            <p:cNvCxnSpPr>
-              <a:stCxn id="7" idx="0"/>
-              <a:endCxn id="12" idx="1"/>
-            </p:cNvCxnSpPr>
-            <p:nvPr/>
-          </p:nvCxnSpPr>
-          <p:spPr>
-            <a:xfrm rot="16200000" flipH="1" flipV="1">
-              <a:off x="1485900" y="2247900"/>
-              <a:ext cx="1333500" cy="3086100"/>
-            </a:xfrm>
-            <a:prstGeom prst="bentConnector4">
-              <a:avLst>
-                <a:gd name="adj1" fmla="val -17143"/>
-                <a:gd name="adj2" fmla="val 107407"/>
-              </a:avLst>
-            </a:prstGeom>
-            <a:ln>
-              <a:tailEnd type="arrow"/>
-            </a:ln>
-          </p:spPr>
-          <p:style>
-            <a:lnRef idx="1">
-              <a:schemeClr val="accent1"/>
-            </a:lnRef>
-            <a:fillRef idx="3">
-              <a:schemeClr val="accent1"/>
-            </a:fillRef>
-            <a:effectRef idx="2">
-              <a:schemeClr val="accent1"/>
-            </a:effectRef>
-            <a:fontRef idx="minor">
-              <a:schemeClr val="lt1"/>
-            </a:fontRef>
-          </p:style>
-        </p:cxnSp>
-      </p:grpSp>
+          <a:prstGeom prst="rect">
+            <a:avLst/>
+          </a:prstGeom>
+          <a:noFill/>
+          <a:ln w="9525">
+            <a:noFill/>
+            <a:miter lim="800000"/>
+            <a:headEnd/>
+            <a:tailEnd/>
+          </a:ln>
+          <a:effectLst/>
+        </p:spPr>
+      </p:pic>
     </p:spTree>
   </p:cSld>
   <p:clrMapOvr>

</xml_diff>

<commit_message>
adjusted formatting and consolidated final two slides
</commit_message>
<xml_diff>
--- a/SOLID Principles - Step By Step Code/SOLID Principles Presentation.pptx
+++ b/SOLID Principles - Step By Step Code/SOLID Principles Presentation.pptx
@@ -5,7 +5,7 @@
     <p:sldMasterId id="2147483960" r:id="rId1"/>
   </p:sldMasterIdLst>
   <p:notesMasterIdLst>
-    <p:notesMasterId r:id="rId38"/>
+    <p:notesMasterId r:id="rId37"/>
   </p:notesMasterIdLst>
   <p:sldIdLst>
     <p:sldId id="332" r:id="rId2"/>
@@ -43,7 +43,6 @@
     <p:sldId id="349" r:id="rId34"/>
     <p:sldId id="350" r:id="rId35"/>
     <p:sldId id="327" r:id="rId36"/>
-    <p:sldId id="328" r:id="rId37"/>
   </p:sldIdLst>
   <p:sldSz cx="9144000" cy="6858000" type="screen4x3"/>
   <p:notesSz cx="6858000" cy="9144000"/>
@@ -1528,36 +1527,6 @@
 </p:sldLayout>
 </file>
 
-<file path=ppt/slideLayouts/slideLayout14.xml><?xml version="1.0" encoding="utf-8"?>
-<p:sldLayout xmlns:a="http://schemas.openxmlformats.org/drawingml/2006/main" xmlns:r="http://schemas.openxmlformats.org/officeDocument/2006/relationships" xmlns:p="http://schemas.openxmlformats.org/presentationml/2006/main" userDrawn="1">
-  <p:cSld name="2_Title and Content">
-    <p:spTree>
-      <p:nvGrpSpPr>
-        <p:cNvPr id="1" name=""/>
-        <p:cNvGrpSpPr/>
-        <p:nvPr/>
-      </p:nvGrpSpPr>
-      <p:grpSpPr>
-        <a:xfrm>
-          <a:off x="0" y="0"/>
-          <a:ext cx="0" cy="0"/>
-          <a:chOff x="0" y="0"/>
-          <a:chExt cx="0" cy="0"/>
-        </a:xfrm>
-      </p:grpSpPr>
-    </p:spTree>
-    <p:extLst>
-      <p:ext uri="{BB962C8B-B14F-4D97-AF65-F5344CB8AC3E}">
-        <p14:creationId xmlns:p14="http://schemas.microsoft.com/office/powerpoint/2010/main" val="778798192"/>
-      </p:ext>
-    </p:extLst>
-  </p:cSld>
-  <p:clrMapOvr>
-    <a:masterClrMapping/>
-  </p:clrMapOvr>
-</p:sldLayout>
-</file>
-
 <file path=ppt/slideLayouts/slideLayout2.xml><?xml version="1.0" encoding="utf-8"?>
 <p:sldLayout xmlns:a="http://schemas.openxmlformats.org/drawingml/2006/main" xmlns:r="http://schemas.openxmlformats.org/officeDocument/2006/relationships" xmlns:p="http://schemas.openxmlformats.org/presentationml/2006/main" type="obj" preserve="1">
   <p:cSld name="Title and Content">
@@ -3929,7 +3898,6 @@
     <p:sldLayoutId id="2147483971" r:id="rId11"/>
     <p:sldLayoutId id="2147483972" r:id="rId12"/>
     <p:sldLayoutId id="2147483973" r:id="rId13"/>
-    <p:sldLayoutId id="2147483974" r:id="rId14"/>
   </p:sldLayoutIdLst>
   <p:hf sldNum="0" hdr="0" ftr="0" dt="0"/>
   <p:txStyles>
@@ -8330,89 +8298,6 @@
               <a:defRPr/>
             </a:pPr>
             <a:endParaRPr lang="en-US"/>
-          </a:p>
-        </p:txBody>
-      </p:sp>
-      <p:sp>
-        <p:nvSpPr>
-          <p:cNvPr id="2054" name="TextBox 16"/>
-          <p:cNvSpPr txBox="1">
-            <a:spLocks noChangeArrowheads="1"/>
-          </p:cNvSpPr>
-          <p:nvPr/>
-        </p:nvSpPr>
-        <p:spPr bwMode="auto">
-          <a:xfrm>
-            <a:off x="2819400" y="6581775"/>
-            <a:ext cx="3429000" cy="276999"/>
-          </a:xfrm>
-          <a:prstGeom prst="rect">
-            <a:avLst/>
-          </a:prstGeom>
-          <a:ln w="12700" cmpd="sng">
-            <a:solidFill>
-              <a:schemeClr val="bg1"/>
-            </a:solidFill>
-            <a:headEnd/>
-            <a:tailEnd/>
-          </a:ln>
-        </p:spPr>
-        <p:style>
-          <a:lnRef idx="2">
-            <a:schemeClr val="accent3">
-              <a:shade val="50000"/>
-            </a:schemeClr>
-          </a:lnRef>
-          <a:fillRef idx="1">
-            <a:schemeClr val="accent3"/>
-          </a:fillRef>
-          <a:effectRef idx="0">
-            <a:schemeClr val="accent3"/>
-          </a:effectRef>
-          <a:fontRef idx="minor">
-            <a:schemeClr val="lt1"/>
-          </a:fontRef>
-        </p:style>
-        <p:txBody>
-          <a:bodyPr>
-            <a:spAutoFit/>
-          </a:bodyPr>
-          <a:lstStyle/>
-          <a:p>
-            <a:pPr algn="ctr"/>
-            <a:r>
-              <a:rPr lang="en-US" sz="1200" dirty="0" smtClean="0">
-                <a:solidFill>
-                  <a:schemeClr val="bg1"/>
-                </a:solidFill>
-                <a:latin typeface="Calibri" pitchFamily="34" charset="0"/>
-              </a:rPr>
-              <a:t>Presentation </a:t>
-            </a:r>
-            <a:r>
-              <a:rPr lang="en-US" sz="1200" dirty="0" smtClean="0">
-                <a:solidFill>
-                  <a:schemeClr val="bg1"/>
-                </a:solidFill>
-                <a:latin typeface="Calibri" pitchFamily="34" charset="0"/>
-              </a:rPr>
-              <a:t>Copyright ©2011 Muted Solutions, </a:t>
-            </a:r>
-            <a:r>
-              <a:rPr lang="en-US" sz="1200" dirty="0" smtClean="0">
-                <a:solidFill>
-                  <a:schemeClr val="bg1"/>
-                </a:solidFill>
-                <a:latin typeface="Calibri" pitchFamily="34" charset="0"/>
-              </a:rPr>
-              <a:t>LLC</a:t>
-            </a:r>
-            <a:endParaRPr lang="en-US" sz="1200" dirty="0">
-              <a:solidFill>
-                <a:schemeClr val="bg1"/>
-              </a:solidFill>
-              <a:latin typeface="Calibri" pitchFamily="34" charset="0"/>
-            </a:endParaRPr>
           </a:p>
         </p:txBody>
       </p:sp>
@@ -18671,13 +18556,13 @@
         </p:nvSpPr>
         <p:spPr>
           <a:xfrm>
-            <a:off x="514350" y="1143000"/>
-            <a:ext cx="8229600" cy="3048000"/>
+            <a:off x="514350" y="1142999"/>
+            <a:ext cx="8229600" cy="3425051"/>
           </a:xfrm>
         </p:spPr>
         <p:txBody>
           <a:bodyPr>
-            <a:normAutofit fontScale="92500" lnSpcReduction="10000"/>
+            <a:noAutofit/>
           </a:bodyPr>
           <a:lstStyle/>
           <a:p>
@@ -18717,17 +18602,17 @@
               <a:t>	</a:t>
             </a:r>
             <a:r>
-              <a:rPr lang="en-US" sz="1900" dirty="0" smtClean="0">
+              <a:rPr lang="en-US" sz="2000" dirty="0" smtClean="0">
                 <a:solidFill>
-                  <a:schemeClr val="bg1"/>
+                  <a:srgbClr val="292934"/>
                 </a:solidFill>
               </a:rPr>
               <a:t>http</a:t>
             </a:r>
             <a:r>
-              <a:rPr lang="en-US" sz="1900" dirty="0" smtClean="0">
+              <a:rPr lang="en-US" sz="2000" dirty="0" smtClean="0">
                 <a:solidFill>
-                  <a:schemeClr val="bg1"/>
+                  <a:srgbClr val="292934"/>
                 </a:solidFill>
               </a:rPr>
               <a:t>://butunclebob.com/ArticleS.UncleBob.PrinciplesOfOod</a:t>
@@ -18740,7 +18625,7 @@
               </a:lnSpc>
               <a:buNone/>
             </a:pPr>
-            <a:endParaRPr lang="en-US" sz="1900" dirty="0" smtClean="0">
+            <a:endParaRPr lang="en-US" sz="2000" dirty="0" smtClean="0">
               <a:solidFill>
                 <a:schemeClr val="bg1"/>
               </a:solidFill>
@@ -18791,7 +18676,7 @@
                   <a:schemeClr val="bg1"/>
                 </a:solidFill>
               </a:rPr>
-              <a:t> SOLID, and Pablo’s </a:t>
+              <a:t> SOLID, SOLID </a:t>
             </a:r>
             <a:r>
               <a:rPr lang="en-US" sz="2000" dirty="0" smtClean="0">
@@ -18799,7 +18684,7 @@
                   <a:schemeClr val="bg1"/>
                 </a:solidFill>
               </a:rPr>
-              <a:t>SOLID E-</a:t>
+              <a:t>E-</a:t>
             </a:r>
             <a:r>
               <a:rPr lang="en-US" sz="2000" dirty="0" smtClean="0">
@@ -18807,7 +18692,7 @@
                   <a:schemeClr val="bg1"/>
                 </a:solidFill>
               </a:rPr>
-              <a:t>Book</a:t>
+              <a:t>Book, and more</a:t>
             </a:r>
           </a:p>
           <a:p>
@@ -18826,26 +18711,14 @@
               <a:t>	</a:t>
             </a:r>
             <a:r>
-              <a:rPr lang="en-US" sz="1900" dirty="0" smtClean="0">
-                <a:solidFill>
-                  <a:schemeClr val="bg1"/>
-                </a:solidFill>
-              </a:rPr>
+              <a:rPr lang="en-US" sz="2000" dirty="0" smtClean="0"/>
               <a:t>http://</a:t>
             </a:r>
             <a:r>
-              <a:rPr lang="en-US" sz="1900" dirty="0" err="1" smtClean="0">
-                <a:solidFill>
-                  <a:schemeClr val="bg1"/>
-                </a:solidFill>
-              </a:rPr>
+              <a:rPr lang="en-US" sz="2000" dirty="0" err="1" smtClean="0"/>
               <a:t>lostechies.com</a:t>
             </a:r>
-            <a:endParaRPr lang="en-US" sz="1900" dirty="0" smtClean="0">
-              <a:solidFill>
-                <a:schemeClr val="bg1"/>
-              </a:solidFill>
-            </a:endParaRPr>
+            <a:endParaRPr lang="en-US" sz="2000" dirty="0" smtClean="0"/>
           </a:p>
           <a:p>
             <a:pPr>
@@ -18854,91 +18727,7 @@
               </a:lnSpc>
               <a:buNone/>
             </a:pPr>
-            <a:endParaRPr lang="en-US" sz="1900" dirty="0">
-              <a:solidFill>
-                <a:schemeClr val="bg1"/>
-              </a:solidFill>
-            </a:endParaRPr>
-          </a:p>
-          <a:p>
-            <a:pPr>
-              <a:lnSpc>
-                <a:spcPct val="80000"/>
-              </a:lnSpc>
-              <a:buNone/>
-            </a:pPr>
-            <a:r>
-              <a:rPr lang="en-US" sz="2000" dirty="0">
-                <a:solidFill>
-                  <a:schemeClr val="bg1"/>
-                </a:solidFill>
-              </a:rPr>
-              <a:t>Agile Principles, Patterns, And Practices In C</a:t>
-            </a:r>
-            <a:r>
-              <a:rPr lang="en-US" sz="2000" dirty="0" smtClean="0">
-                <a:solidFill>
-                  <a:schemeClr val="bg1"/>
-                </a:solidFill>
-              </a:rPr>
-              <a:t>#</a:t>
-            </a:r>
-          </a:p>
-          <a:p>
-            <a:pPr>
-              <a:lnSpc>
-                <a:spcPct val="80000"/>
-              </a:lnSpc>
-              <a:buNone/>
-            </a:pPr>
-            <a:r>
-              <a:rPr lang="en-US" sz="2000" dirty="0">
-                <a:solidFill>
-                  <a:schemeClr val="bg1"/>
-                </a:solidFill>
-              </a:rPr>
-              <a:t>	</a:t>
-            </a:r>
-            <a:r>
-              <a:rPr lang="en-US" sz="1900" dirty="0" smtClean="0">
-                <a:solidFill>
-                  <a:schemeClr val="bg1"/>
-                </a:solidFill>
-              </a:rPr>
-              <a:t>by </a:t>
-            </a:r>
-            <a:r>
-              <a:rPr lang="en-US" sz="1900" dirty="0">
-                <a:solidFill>
-                  <a:schemeClr val="bg1"/>
-                </a:solidFill>
-              </a:rPr>
-              <a:t>Robert (Uncle Bob) Martin and Micah </a:t>
-            </a:r>
-            <a:r>
-              <a:rPr lang="en-US" sz="1900" dirty="0" smtClean="0">
-                <a:solidFill>
-                  <a:schemeClr val="bg1"/>
-                </a:solidFill>
-              </a:rPr>
-              <a:t>Martin</a:t>
-            </a:r>
-            <a:r>
-              <a:rPr lang="en-US" dirty="0" smtClean="0">
-                <a:solidFill>
-                  <a:schemeClr val="bg1"/>
-                </a:solidFill>
-              </a:rPr>
-              <a:t/>
-            </a:r>
-            <a:br>
-              <a:rPr lang="en-US" dirty="0" smtClean="0">
-                <a:solidFill>
-                  <a:schemeClr val="bg1"/>
-                </a:solidFill>
-              </a:rPr>
-            </a:br>
-            <a:endParaRPr lang="en-US" dirty="0">
+            <a:endParaRPr lang="en-US" sz="2000" dirty="0">
               <a:solidFill>
                 <a:schemeClr val="bg1"/>
               </a:solidFill>
@@ -18973,148 +18762,661 @@
               <a:buNone/>
             </a:pPr>
             <a:r>
-              <a:rPr lang="pl-PL" sz="1900" dirty="0">
+              <a:rPr lang="pl-PL" dirty="0">
+                <a:solidFill>
+                  <a:srgbClr val="292934"/>
+                </a:solidFill>
+              </a:rPr>
+              <a:t>http://www.code-magazine.com/article.aspx?quickid=</a:t>
+            </a:r>
+            <a:r>
+              <a:rPr lang="pl-PL" dirty="0" smtClean="0">
+                <a:solidFill>
+                  <a:srgbClr val="292934"/>
+                </a:solidFill>
+              </a:rPr>
+              <a:t>1001061</a:t>
+            </a:r>
+            <a:endParaRPr lang="en-US" dirty="0">
+              <a:solidFill>
+                <a:srgbClr val="292934"/>
+              </a:solidFill>
+            </a:endParaRPr>
+          </a:p>
+          <a:p>
+            <a:pPr>
+              <a:lnSpc>
+                <a:spcPct val="80000"/>
+              </a:lnSpc>
+              <a:buNone/>
+            </a:pPr>
+            <a:endParaRPr lang="en-US" sz="2000" dirty="0" smtClean="0">
+              <a:solidFill>
+                <a:schemeClr val="bg1"/>
+              </a:solidFill>
+            </a:endParaRPr>
+          </a:p>
+          <a:p>
+            <a:pPr>
+              <a:lnSpc>
+                <a:spcPct val="80000"/>
+              </a:lnSpc>
+              <a:buNone/>
+            </a:pPr>
+            <a:r>
+              <a:rPr lang="en-US" sz="2000" dirty="0" smtClean="0">
                 <a:solidFill>
                   <a:schemeClr val="bg1"/>
                 </a:solidFill>
               </a:rPr>
-              <a:t>http://</a:t>
+              <a:t>Agile </a:t>
             </a:r>
             <a:r>
-              <a:rPr lang="pl-PL" sz="1900" dirty="0" err="1">
+              <a:rPr lang="en-US" sz="2000" dirty="0">
                 <a:solidFill>
                   <a:schemeClr val="bg1"/>
                 </a:solidFill>
               </a:rPr>
-              <a:t>www.code-magazine.com</a:t>
+              <a:t>Principles, Patterns, And Practices In C#</a:t>
+            </a:r>
+          </a:p>
+          <a:p>
+            <a:pPr>
+              <a:lnSpc>
+                <a:spcPct val="80000"/>
+              </a:lnSpc>
+              <a:buNone/>
+            </a:pPr>
+            <a:r>
+              <a:rPr lang="en-US" sz="2000" dirty="0">
+                <a:solidFill>
+                  <a:srgbClr val="292934"/>
+                </a:solidFill>
+              </a:rPr>
+              <a:t>	by Robert </a:t>
             </a:r>
             <a:r>
-              <a:rPr lang="pl-PL" sz="1900" dirty="0">
+              <a:rPr lang="en-US" sz="2000" dirty="0" smtClean="0">
+                <a:solidFill>
+                  <a:srgbClr val="292934"/>
+                </a:solidFill>
+              </a:rPr>
+              <a:t>and </a:t>
+            </a:r>
+            <a:r>
+              <a:rPr lang="en-US" sz="2000" dirty="0">
+                <a:solidFill>
+                  <a:srgbClr val="292934"/>
+                </a:solidFill>
+              </a:rPr>
+              <a:t>Micah </a:t>
+            </a:r>
+            <a:r>
+              <a:rPr lang="en-US" sz="2000" dirty="0" smtClean="0">
+                <a:solidFill>
+                  <a:srgbClr val="292934"/>
+                </a:solidFill>
+              </a:rPr>
+              <a:t>Martin, published by Prentice Hall</a:t>
+            </a:r>
+            <a:endParaRPr lang="en-US" sz="2000" dirty="0">
+              <a:solidFill>
+                <a:srgbClr val="292934"/>
+              </a:solidFill>
+            </a:endParaRPr>
+          </a:p>
+        </p:txBody>
+      </p:sp>
+      <p:sp>
+        <p:nvSpPr>
+          <p:cNvPr id="7" name="Rectangle 9"/>
+          <p:cNvSpPr txBox="1">
+            <a:spLocks noChangeArrowheads="1"/>
+          </p:cNvSpPr>
+          <p:nvPr/>
+        </p:nvSpPr>
+        <p:spPr>
+          <a:xfrm>
+            <a:off x="112713" y="4800600"/>
+            <a:ext cx="4427298" cy="1933575"/>
+          </a:xfrm>
+          <a:prstGeom prst="rect">
+            <a:avLst/>
+          </a:prstGeom>
+        </p:spPr>
+        <p:txBody>
+          <a:bodyPr vert="horz" lIns="91440" tIns="45720" rIns="91440" bIns="45720" rtlCol="0">
+            <a:normAutofit/>
+          </a:bodyPr>
+          <a:lstStyle>
+            <a:lvl1pPr marL="182880" indent="-182880" algn="l" defTabSz="914400" rtl="0" eaLnBrk="1" latinLnBrk="0" hangingPunct="1">
+              <a:spcBef>
+                <a:spcPct val="20000"/>
+              </a:spcBef>
+              <a:buClr>
+                <a:schemeClr val="accent1"/>
+              </a:buClr>
+              <a:buSzPct val="85000"/>
+              <a:buFont typeface="Arial" pitchFamily="34" charset="0"/>
+              <a:buChar char="•"/>
+              <a:defRPr sz="2400" kern="1200">
+                <a:solidFill>
+                  <a:schemeClr val="tx1"/>
+                </a:solidFill>
+                <a:latin typeface="+mn-lt"/>
+                <a:ea typeface="+mn-ea"/>
+                <a:cs typeface="+mn-cs"/>
+              </a:defRPr>
+            </a:lvl1pPr>
+            <a:lvl2pPr marL="457200" indent="-182880" algn="l" defTabSz="914400" rtl="0" eaLnBrk="1" latinLnBrk="0" hangingPunct="1">
+              <a:spcBef>
+                <a:spcPct val="20000"/>
+              </a:spcBef>
+              <a:buClr>
+                <a:schemeClr val="accent1"/>
+              </a:buClr>
+              <a:buSzPct val="85000"/>
+              <a:buFont typeface="Arial" pitchFamily="34" charset="0"/>
+              <a:buChar char="•"/>
+              <a:defRPr sz="2000" kern="1200">
+                <a:solidFill>
+                  <a:schemeClr val="tx1"/>
+                </a:solidFill>
+                <a:latin typeface="+mn-lt"/>
+                <a:ea typeface="+mn-ea"/>
+                <a:cs typeface="+mn-cs"/>
+              </a:defRPr>
+            </a:lvl2pPr>
+            <a:lvl3pPr marL="731520" indent="-182880" algn="l" defTabSz="914400" rtl="0" eaLnBrk="1" latinLnBrk="0" hangingPunct="1">
+              <a:spcBef>
+                <a:spcPct val="20000"/>
+              </a:spcBef>
+              <a:buClr>
+                <a:schemeClr val="accent1"/>
+              </a:buClr>
+              <a:buSzPct val="90000"/>
+              <a:buFont typeface="Arial" pitchFamily="34" charset="0"/>
+              <a:buChar char="•"/>
+              <a:defRPr sz="1800" kern="1200">
+                <a:solidFill>
+                  <a:schemeClr val="tx1"/>
+                </a:solidFill>
+                <a:latin typeface="+mn-lt"/>
+                <a:ea typeface="+mn-ea"/>
+                <a:cs typeface="+mn-cs"/>
+              </a:defRPr>
+            </a:lvl3pPr>
+            <a:lvl4pPr marL="1005840" indent="-182880" algn="l" defTabSz="914400" rtl="0" eaLnBrk="1" latinLnBrk="0" hangingPunct="1">
+              <a:spcBef>
+                <a:spcPct val="20000"/>
+              </a:spcBef>
+              <a:buClr>
+                <a:schemeClr val="accent1"/>
+              </a:buClr>
+              <a:buFont typeface="Arial" pitchFamily="34" charset="0"/>
+              <a:buChar char="•"/>
+              <a:defRPr sz="1600" kern="1200">
+                <a:solidFill>
+                  <a:schemeClr val="tx1"/>
+                </a:solidFill>
+                <a:latin typeface="+mn-lt"/>
+                <a:ea typeface="+mn-ea"/>
+                <a:cs typeface="+mn-cs"/>
+              </a:defRPr>
+            </a:lvl4pPr>
+            <a:lvl5pPr marL="1188720" indent="-137160" algn="l" defTabSz="914400" rtl="0" eaLnBrk="1" latinLnBrk="0" hangingPunct="1">
+              <a:spcBef>
+                <a:spcPct val="20000"/>
+              </a:spcBef>
+              <a:buClr>
+                <a:schemeClr val="accent1"/>
+              </a:buClr>
+              <a:buSzPct val="100000"/>
+              <a:buFont typeface="Arial" pitchFamily="34" charset="0"/>
+              <a:buChar char="•"/>
+              <a:defRPr sz="1400" kern="1200" baseline="0">
+                <a:solidFill>
+                  <a:schemeClr val="tx1"/>
+                </a:solidFill>
+                <a:latin typeface="+mn-lt"/>
+                <a:ea typeface="+mn-ea"/>
+                <a:cs typeface="+mn-cs"/>
+              </a:defRPr>
+            </a:lvl5pPr>
+            <a:lvl6pPr marL="1371600" indent="-182880" algn="l" defTabSz="914400" rtl="0" eaLnBrk="1" latinLnBrk="0" hangingPunct="1">
+              <a:spcBef>
+                <a:spcPct val="20000"/>
+              </a:spcBef>
+              <a:buClr>
+                <a:schemeClr val="accent1"/>
+              </a:buClr>
+              <a:buFont typeface="Arial" pitchFamily="34" charset="0"/>
+              <a:buChar char="•"/>
+              <a:defRPr sz="1300" kern="1200">
+                <a:solidFill>
+                  <a:schemeClr val="tx1"/>
+                </a:solidFill>
+                <a:latin typeface="+mn-lt"/>
+                <a:ea typeface="+mn-ea"/>
+                <a:cs typeface="+mn-cs"/>
+              </a:defRPr>
+            </a:lvl6pPr>
+            <a:lvl7pPr marL="1554480" indent="-182880" algn="l" defTabSz="914400" rtl="0" eaLnBrk="1" latinLnBrk="0" hangingPunct="1">
+              <a:spcBef>
+                <a:spcPct val="20000"/>
+              </a:spcBef>
+              <a:buClr>
+                <a:schemeClr val="accent1"/>
+              </a:buClr>
+              <a:buFont typeface="Arial" pitchFamily="34" charset="0"/>
+              <a:buChar char="•"/>
+              <a:defRPr sz="1300" kern="1200">
+                <a:solidFill>
+                  <a:schemeClr val="tx1"/>
+                </a:solidFill>
+                <a:latin typeface="+mn-lt"/>
+                <a:ea typeface="+mn-ea"/>
+                <a:cs typeface="+mn-cs"/>
+              </a:defRPr>
+            </a:lvl7pPr>
+            <a:lvl8pPr marL="1737360" indent="-182880" algn="l" defTabSz="914400" rtl="0" eaLnBrk="1" latinLnBrk="0" hangingPunct="1">
+              <a:spcBef>
+                <a:spcPct val="20000"/>
+              </a:spcBef>
+              <a:buClr>
+                <a:schemeClr val="accent1"/>
+              </a:buClr>
+              <a:buFont typeface="Arial" pitchFamily="34" charset="0"/>
+              <a:buChar char="•"/>
+              <a:defRPr sz="1300" kern="1200">
+                <a:solidFill>
+                  <a:schemeClr val="tx1"/>
+                </a:solidFill>
+                <a:latin typeface="+mn-lt"/>
+                <a:ea typeface="+mn-ea"/>
+                <a:cs typeface="+mn-cs"/>
+              </a:defRPr>
+            </a:lvl8pPr>
+            <a:lvl9pPr marL="1920240" indent="-182880" algn="l" defTabSz="914400" rtl="0" eaLnBrk="1" latinLnBrk="0" hangingPunct="1">
+              <a:spcBef>
+                <a:spcPct val="20000"/>
+              </a:spcBef>
+              <a:buClr>
+                <a:schemeClr val="accent1"/>
+              </a:buClr>
+              <a:buFont typeface="Arial" pitchFamily="34" charset="0"/>
+              <a:buChar char="•"/>
+              <a:defRPr sz="1300" kern="1200">
+                <a:solidFill>
+                  <a:schemeClr val="tx1"/>
+                </a:solidFill>
+                <a:latin typeface="+mn-lt"/>
+                <a:ea typeface="+mn-ea"/>
+                <a:cs typeface="+mn-cs"/>
+              </a:defRPr>
+            </a:lvl9pPr>
+          </a:lstStyle>
+          <a:p>
+            <a:pPr>
+              <a:lnSpc>
+                <a:spcPct val="80000"/>
+              </a:lnSpc>
+              <a:buFont typeface="Arial" charset="0"/>
+              <a:buNone/>
+            </a:pPr>
+            <a:r>
+              <a:rPr lang="en-US" sz="1800" dirty="0" smtClean="0">
                 <a:solidFill>
                   <a:schemeClr val="bg1"/>
                 </a:solidFill>
               </a:rPr>
-              <a:t>/</a:t>
+              <a:t>Derick Bailey  -  Independent Consultant</a:t>
             </a:r>
+          </a:p>
+          <a:p>
+            <a:pPr>
+              <a:lnSpc>
+                <a:spcPct val="80000"/>
+              </a:lnSpc>
+              <a:buFont typeface="Arial" charset="0"/>
+              <a:buNone/>
+            </a:pPr>
             <a:r>
-              <a:rPr lang="pl-PL" sz="1900" dirty="0" err="1">
+              <a:rPr lang="en-US" sz="1800" dirty="0" smtClean="0">
                 <a:solidFill>
                   <a:schemeClr val="bg1"/>
                 </a:solidFill>
               </a:rPr>
-              <a:t>article.aspx?quickid</a:t>
+              <a:t>Muted Solutions, LLC</a:t>
             </a:r>
+          </a:p>
+          <a:p>
+            <a:pPr>
+              <a:lnSpc>
+                <a:spcPct val="80000"/>
+              </a:lnSpc>
+              <a:buFont typeface="Arial" charset="0"/>
+              <a:buNone/>
+            </a:pPr>
+            <a:endParaRPr lang="en-US" sz="1800" dirty="0" smtClean="0">
+              <a:solidFill>
+                <a:schemeClr val="bg1"/>
+              </a:solidFill>
+            </a:endParaRPr>
+          </a:p>
+          <a:p>
+            <a:pPr>
+              <a:lnSpc>
+                <a:spcPct val="80000"/>
+              </a:lnSpc>
+              <a:buFont typeface="Arial" pitchFamily="34" charset="0"/>
+              <a:buNone/>
+            </a:pPr>
             <a:r>
-              <a:rPr lang="pl-PL" sz="1900" dirty="0">
+              <a:rPr lang="en-US" sz="1800" dirty="0" smtClean="0">
                 <a:solidFill>
                   <a:schemeClr val="bg1"/>
                 </a:solidFill>
               </a:rPr>
-              <a:t>=1001061</a:t>
+              <a:t>WWW: </a:t>
             </a:r>
-            <a:endParaRPr lang="en-US" sz="1900" dirty="0" smtClean="0">
+          </a:p>
+          <a:p>
+            <a:pPr>
+              <a:lnSpc>
+                <a:spcPct val="80000"/>
+              </a:lnSpc>
+              <a:buFont typeface="Arial" pitchFamily="34" charset="0"/>
+              <a:buNone/>
+            </a:pPr>
+            <a:r>
+              <a:rPr lang="en-US" sz="1800" dirty="0" smtClean="0">
+                <a:solidFill>
+                  <a:schemeClr val="bg1"/>
+                </a:solidFill>
+              </a:rPr>
+              <a:t>    </a:t>
+            </a:r>
+            <a:r>
+              <a:rPr lang="en-US" sz="1800" dirty="0" err="1" smtClean="0">
+                <a:solidFill>
+                  <a:schemeClr val="bg1"/>
+                </a:solidFill>
+              </a:rPr>
+              <a:t>mutedsolutions.com</a:t>
+            </a:r>
+            <a:endParaRPr lang="en-US" sz="1800" dirty="0" smtClean="0">
               <a:solidFill>
                 <a:schemeClr val="bg1"/>
               </a:solidFill>
             </a:endParaRPr>
           </a:p>
+          <a:p>
+            <a:pPr>
+              <a:lnSpc>
+                <a:spcPct val="80000"/>
+              </a:lnSpc>
+              <a:buFont typeface="Arial" pitchFamily="34" charset="0"/>
+              <a:buNone/>
+            </a:pPr>
+            <a:r>
+              <a:rPr lang="en-US" sz="1800" dirty="0">
+                <a:solidFill>
+                  <a:schemeClr val="bg1"/>
+                </a:solidFill>
+              </a:rPr>
+              <a:t> </a:t>
+            </a:r>
+            <a:r>
+              <a:rPr lang="en-US" sz="1800" dirty="0" smtClean="0">
+                <a:solidFill>
+                  <a:schemeClr val="bg1"/>
+                </a:solidFill>
+              </a:rPr>
+              <a:t>   </a:t>
+            </a:r>
+            <a:r>
+              <a:rPr lang="en-US" sz="1800" dirty="0" err="1" smtClean="0">
+                <a:solidFill>
+                  <a:schemeClr val="bg1"/>
+                </a:solidFill>
+              </a:rPr>
+              <a:t>derickbailey.lostechies.com</a:t>
+            </a:r>
+            <a:endParaRPr lang="en-US" sz="1800" dirty="0" smtClean="0">
+              <a:solidFill>
+                <a:schemeClr val="bg1"/>
+              </a:solidFill>
+            </a:endParaRPr>
+          </a:p>
         </p:txBody>
       </p:sp>
-    </p:spTree>
-    <p:extLst>
-      <p:ext uri="{BB962C8B-B14F-4D97-AF65-F5344CB8AC3E}">
-        <p14:creationId xmlns:p14="http://schemas.microsoft.com/office/powerpoint/2010/main" val="90861013"/>
-      </p:ext>
-    </p:extLst>
-  </p:cSld>
-  <p:clrMapOvr>
-    <a:masterClrMapping/>
-  </p:clrMapOvr>
-  <p:timing>
-    <p:tnLst>
-      <p:par>
-        <p:cTn xmlns:p14="http://schemas.microsoft.com/office/powerpoint/2010/main" id="1" dur="indefinite" restart="never" nodeType="tmRoot"/>
-      </p:par>
-    </p:tnLst>
-  </p:timing>
-</p:sld>
-</file>
-
-<file path=ppt/slides/slide36.xml><?xml version="1.0" encoding="utf-8"?>
-<p:sld xmlns:a="http://schemas.openxmlformats.org/drawingml/2006/main" xmlns:r="http://schemas.openxmlformats.org/officeDocument/2006/relationships" xmlns:p="http://schemas.openxmlformats.org/presentationml/2006/main">
-  <p:cSld>
-    <p:spTree>
-      <p:nvGrpSpPr>
-        <p:cNvPr id="1" name=""/>
-        <p:cNvGrpSpPr/>
-        <p:nvPr/>
-      </p:nvGrpSpPr>
-      <p:grpSpPr>
-        <a:xfrm>
-          <a:off x="0" y="0"/>
-          <a:ext cx="0" cy="0"/>
-          <a:chOff x="0" y="0"/>
-          <a:chExt cx="0" cy="0"/>
-        </a:xfrm>
-      </p:grpSpPr>
       <p:sp>
         <p:nvSpPr>
-          <p:cNvPr id="12" name="Rectangle 11"/>
+          <p:cNvPr id="2" name="Rectangle 1"/>
           <p:cNvSpPr/>
+          <p:nvPr/>
+        </p:nvSpPr>
+        <p:spPr>
+          <a:xfrm>
+            <a:off x="5544690" y="4800600"/>
+            <a:ext cx="3475485" cy="1652760"/>
+          </a:xfrm>
+          <a:prstGeom prst="rect">
+            <a:avLst/>
+          </a:prstGeom>
+        </p:spPr>
+        <p:txBody>
+          <a:bodyPr wrap="square">
+            <a:spAutoFit/>
+          </a:bodyPr>
+          <a:lstStyle/>
+          <a:p>
+            <a:pPr>
+              <a:lnSpc>
+                <a:spcPct val="80000"/>
+              </a:lnSpc>
+              <a:buFont typeface="Arial" charset="0"/>
+              <a:buNone/>
+            </a:pPr>
+            <a:endParaRPr lang="en-US" dirty="0" smtClean="0">
+              <a:solidFill>
+                <a:schemeClr val="bg1"/>
+              </a:solidFill>
+            </a:endParaRPr>
+          </a:p>
+          <a:p>
+            <a:pPr>
+              <a:lnSpc>
+                <a:spcPct val="80000"/>
+              </a:lnSpc>
+              <a:buFont typeface="Arial" charset="0"/>
+              <a:buNone/>
+            </a:pPr>
+            <a:r>
+              <a:rPr lang="en-US" dirty="0" smtClean="0">
+                <a:solidFill>
+                  <a:schemeClr val="bg1"/>
+                </a:solidFill>
+              </a:rPr>
+              <a:t>Email</a:t>
+            </a:r>
+            <a:r>
+              <a:rPr lang="en-US" dirty="0">
+                <a:solidFill>
+                  <a:schemeClr val="bg1"/>
+                </a:solidFill>
+              </a:rPr>
+              <a:t>: </a:t>
+            </a:r>
+            <a:endParaRPr lang="en-US" dirty="0" smtClean="0">
+              <a:solidFill>
+                <a:schemeClr val="bg1"/>
+              </a:solidFill>
+            </a:endParaRPr>
+          </a:p>
+          <a:p>
+            <a:pPr>
+              <a:lnSpc>
+                <a:spcPct val="80000"/>
+              </a:lnSpc>
+              <a:buFont typeface="Arial" charset="0"/>
+              <a:buNone/>
+            </a:pPr>
+            <a:r>
+              <a:rPr lang="en-US" dirty="0" smtClean="0">
+                <a:solidFill>
+                  <a:schemeClr val="bg1"/>
+                </a:solidFill>
+              </a:rPr>
+              <a:t>    derick</a:t>
+            </a:r>
+            <a:r>
+              <a:rPr lang="en-US" dirty="0">
+                <a:solidFill>
+                  <a:schemeClr val="bg1"/>
+                </a:solidFill>
+              </a:rPr>
+              <a:t>@mutedsolutions.com</a:t>
+            </a:r>
+          </a:p>
+          <a:p>
+            <a:pPr>
+              <a:lnSpc>
+                <a:spcPct val="80000"/>
+              </a:lnSpc>
+              <a:buFont typeface="Arial" charset="0"/>
+              <a:buNone/>
+            </a:pPr>
+            <a:r>
+              <a:rPr lang="en-US" dirty="0" smtClean="0">
+                <a:solidFill>
+                  <a:schemeClr val="bg1"/>
+                </a:solidFill>
+              </a:rPr>
+              <a:t>    </a:t>
+            </a:r>
+            <a:r>
+              <a:rPr lang="en-US" dirty="0" err="1" smtClean="0">
+                <a:solidFill>
+                  <a:schemeClr val="bg1"/>
+                </a:solidFill>
+              </a:rPr>
+              <a:t>derick</a:t>
+            </a:r>
+            <a:r>
+              <a:rPr lang="en-US" dirty="0" err="1">
+                <a:solidFill>
+                  <a:schemeClr val="bg1"/>
+                </a:solidFill>
+              </a:rPr>
+              <a:t>@derickbailey.com</a:t>
+            </a:r>
+            <a:endParaRPr lang="en-US" dirty="0">
+              <a:solidFill>
+                <a:schemeClr val="bg1"/>
+              </a:solidFill>
+            </a:endParaRPr>
+          </a:p>
+          <a:p>
+            <a:pPr lvl="1">
+              <a:lnSpc>
+                <a:spcPct val="80000"/>
+              </a:lnSpc>
+              <a:buFont typeface="Arial" charset="0"/>
+              <a:buNone/>
+            </a:pPr>
+            <a:endParaRPr lang="en-US" dirty="0">
+              <a:solidFill>
+                <a:schemeClr val="bg1"/>
+              </a:solidFill>
+            </a:endParaRPr>
+          </a:p>
+          <a:p>
+            <a:pPr>
+              <a:lnSpc>
+                <a:spcPct val="80000"/>
+              </a:lnSpc>
+              <a:buFont typeface="Arial" charset="0"/>
+              <a:buNone/>
+            </a:pPr>
+            <a:r>
+              <a:rPr lang="en-US" dirty="0">
+                <a:solidFill>
+                  <a:schemeClr val="bg1"/>
+                </a:solidFill>
+              </a:rPr>
+              <a:t>Twitter: </a:t>
+            </a:r>
+            <a:endParaRPr lang="en-US" dirty="0" smtClean="0">
+              <a:solidFill>
+                <a:schemeClr val="bg1"/>
+              </a:solidFill>
+            </a:endParaRPr>
+          </a:p>
+          <a:p>
+            <a:pPr>
+              <a:lnSpc>
+                <a:spcPct val="80000"/>
+              </a:lnSpc>
+              <a:buFont typeface="Arial" charset="0"/>
+              <a:buNone/>
+            </a:pPr>
+            <a:r>
+              <a:rPr lang="en-US" dirty="0">
+                <a:solidFill>
+                  <a:schemeClr val="bg1"/>
+                </a:solidFill>
+              </a:rPr>
+              <a:t> </a:t>
+            </a:r>
+            <a:r>
+              <a:rPr lang="en-US" dirty="0" smtClean="0">
+                <a:solidFill>
+                  <a:schemeClr val="bg1"/>
+                </a:solidFill>
+              </a:rPr>
+              <a:t>   @</a:t>
+            </a:r>
+            <a:r>
+              <a:rPr lang="en-US" dirty="0" err="1">
+                <a:solidFill>
+                  <a:schemeClr val="bg1"/>
+                </a:solidFill>
+              </a:rPr>
+              <a:t>derickbailey</a:t>
+            </a:r>
+            <a:endParaRPr lang="en-US" dirty="0">
+              <a:solidFill>
+                <a:schemeClr val="bg1"/>
+              </a:solidFill>
+            </a:endParaRPr>
+          </a:p>
+        </p:txBody>
+      </p:sp>
+      <p:sp>
+        <p:nvSpPr>
+          <p:cNvPr id="9" name="TextBox 16"/>
+          <p:cNvSpPr txBox="1">
+            <a:spLocks noChangeArrowheads="1"/>
+          </p:cNvSpPr>
           <p:nvPr/>
         </p:nvSpPr>
         <p:spPr bwMode="auto">
           <a:xfrm>
-            <a:off x="0" y="0"/>
-            <a:ext cx="9144000" cy="4648200"/>
+            <a:off x="2819400" y="6581775"/>
+            <a:ext cx="3429000" cy="276999"/>
           </a:xfrm>
           <a:prstGeom prst="rect">
             <a:avLst/>
           </a:prstGeom>
-          <a:ln/>
-        </p:spPr>
-        <p:style>
-          <a:lnRef idx="2">
-            <a:schemeClr val="accent4">
-              <a:shade val="50000"/>
-            </a:schemeClr>
-          </a:lnRef>
-          <a:fillRef idx="1">
-            <a:schemeClr val="accent4"/>
-          </a:fillRef>
-          <a:effectRef idx="0">
-            <a:schemeClr val="accent4"/>
-          </a:effectRef>
-          <a:fontRef idx="minor">
-            <a:schemeClr val="lt1"/>
-          </a:fontRef>
-        </p:style>
-        <p:txBody>
-          <a:bodyPr anchor="ctr"/>
-          <a:lstStyle/>
-          <a:p>
-            <a:pPr algn="ctr">
-              <a:defRPr/>
-            </a:pPr>
-            <a:endParaRPr lang="en-US"/>
-          </a:p>
-        </p:txBody>
-      </p:sp>
-      <p:sp>
-        <p:nvSpPr>
-          <p:cNvPr id="13" name="Rectangle 12"/>
-          <p:cNvSpPr/>
-          <p:nvPr/>
-        </p:nvSpPr>
-        <p:spPr bwMode="auto">
-          <a:xfrm>
-            <a:off x="0" y="4724400"/>
-            <a:ext cx="9153525" cy="2133600"/>
-          </a:xfrm>
-          <a:prstGeom prst="rect">
-            <a:avLst/>
-          </a:prstGeom>
-          <a:ln/>
+          <a:ln w="12700" cmpd="sng">
+            <a:solidFill>
+              <a:schemeClr val="bg1"/>
+            </a:solidFill>
+            <a:headEnd/>
+            <a:tailEnd/>
+          </a:ln>
         </p:spPr>
         <p:style>
           <a:lnRef idx="2">
@@ -19133,356 +19435,35 @@
           </a:fontRef>
         </p:style>
         <p:txBody>
-          <a:bodyPr anchor="ctr"/>
+          <a:bodyPr>
+            <a:spAutoFit/>
+          </a:bodyPr>
           <a:lstStyle/>
           <a:p>
-            <a:pPr algn="ctr">
-              <a:defRPr/>
-            </a:pPr>
-            <a:endParaRPr lang="en-US"/>
-          </a:p>
-        </p:txBody>
-      </p:sp>
-      <p:sp>
-        <p:nvSpPr>
-          <p:cNvPr id="16" name="Rectangle 15"/>
-          <p:cNvSpPr/>
-          <p:nvPr/>
-        </p:nvSpPr>
-        <p:spPr bwMode="auto">
-          <a:xfrm>
-            <a:off x="112713" y="4800600"/>
-            <a:ext cx="8907462" cy="1933575"/>
-          </a:xfrm>
-          <a:prstGeom prst="rect">
-            <a:avLst/>
-          </a:prstGeom>
-          <a:noFill/>
-          <a:ln w="12700">
-            <a:solidFill>
-              <a:schemeClr val="bg1"/>
-            </a:solidFill>
-          </a:ln>
-        </p:spPr>
-        <p:style>
-          <a:lnRef idx="2">
-            <a:schemeClr val="accent1">
-              <a:shade val="50000"/>
-            </a:schemeClr>
-          </a:lnRef>
-          <a:fillRef idx="1">
-            <a:schemeClr val="accent1"/>
-          </a:fillRef>
-          <a:effectRef idx="0">
-            <a:schemeClr val="accent1"/>
-          </a:effectRef>
-          <a:fontRef idx="minor">
-            <a:schemeClr val="lt1"/>
-          </a:fontRef>
-        </p:style>
-        <p:txBody>
-          <a:bodyPr anchor="ctr"/>
-          <a:lstStyle/>
-          <a:p>
-            <a:pPr algn="ctr">
-              <a:defRPr/>
-            </a:pPr>
-            <a:endParaRPr lang="en-US"/>
-          </a:p>
-        </p:txBody>
-      </p:sp>
-      <p:sp>
-        <p:nvSpPr>
-          <p:cNvPr id="5127" name="Rectangle 8"/>
-          <p:cNvSpPr>
-            <a:spLocks noGrp="1" noChangeArrowheads="1"/>
-          </p:cNvSpPr>
-          <p:nvPr>
-            <p:ph type="title" idx="4294967295"/>
-          </p:nvPr>
-        </p:nvSpPr>
-        <p:spPr bwMode="auto">
-          <a:xfrm>
-            <a:off x="495300" y="200025"/>
-            <a:ext cx="8343900" cy="919163"/>
-          </a:xfrm>
-          <a:prstGeom prst="rect">
-            <a:avLst/>
-          </a:prstGeom>
-          <a:noFill/>
-          <a:ln>
-            <a:miter lim="800000"/>
-            <a:headEnd/>
-            <a:tailEnd/>
-          </a:ln>
-        </p:spPr>
-        <p:txBody>
-          <a:bodyPr/>
-          <a:lstStyle/>
-          <a:p>
-            <a:pPr eaLnBrk="1" hangingPunct="1"/>
+            <a:pPr algn="ctr"/>
             <a:r>
-              <a:rPr lang="en-US" dirty="0" smtClean="0">
+              <a:rPr lang="en-US" sz="1200" dirty="0" smtClean="0">
                 <a:solidFill>
                   <a:schemeClr val="bg1"/>
                 </a:solidFill>
+                <a:latin typeface="Calibri" pitchFamily="34" charset="0"/>
               </a:rPr>
-              <a:t>About Me… Derick Bailey</a:t>
+              <a:t>Copyright ©2011 Muted Solutions, </a:t>
             </a:r>
-          </a:p>
-        </p:txBody>
-      </p:sp>
-      <p:sp>
-        <p:nvSpPr>
-          <p:cNvPr id="5128" name="Rectangle 9"/>
-          <p:cNvSpPr>
-            <a:spLocks noGrp="1" noChangeArrowheads="1"/>
-          </p:cNvSpPr>
-          <p:nvPr>
-            <p:ph idx="4294967295"/>
-          </p:nvPr>
-        </p:nvSpPr>
-        <p:spPr>
-          <a:xfrm>
-            <a:off x="514350" y="1143000"/>
-            <a:ext cx="8229600" cy="3276600"/>
-          </a:xfrm>
-        </p:spPr>
-        <p:txBody>
-          <a:bodyPr/>
-          <a:lstStyle/>
-          <a:p>
-            <a:pPr eaLnBrk="1" hangingPunct="1">
-              <a:lnSpc>
-                <a:spcPct val="80000"/>
-              </a:lnSpc>
-              <a:buFont typeface="Arial" charset="0"/>
-              <a:buNone/>
-            </a:pPr>
             <a:r>
-              <a:rPr lang="en-US" sz="1800" dirty="0" smtClean="0">
+              <a:rPr lang="en-US" sz="1200" dirty="0" smtClean="0">
                 <a:solidFill>
                   <a:schemeClr val="bg1"/>
                 </a:solidFill>
+                <a:latin typeface="Calibri" pitchFamily="34" charset="0"/>
               </a:rPr>
-              <a:t>Independent Consultant and Chief Ninja @ Muted Solutions, LLC</a:t>
+              <a:t>LLC</a:t>
             </a:r>
-            <a:endParaRPr lang="en-US" sz="1800" dirty="0" smtClean="0">
+            <a:endParaRPr lang="en-US" sz="1200" dirty="0">
               <a:solidFill>
                 <a:schemeClr val="bg1"/>
               </a:solidFill>
-            </a:endParaRPr>
-          </a:p>
-          <a:p>
-            <a:pPr eaLnBrk="1" hangingPunct="1">
-              <a:lnSpc>
-                <a:spcPct val="80000"/>
-              </a:lnSpc>
-              <a:buFont typeface="Arial" charset="0"/>
-              <a:buNone/>
-            </a:pPr>
-            <a:endParaRPr lang="en-US" sz="1800" dirty="0" smtClean="0">
-              <a:solidFill>
-                <a:schemeClr val="bg1"/>
-              </a:solidFill>
-            </a:endParaRPr>
-          </a:p>
-          <a:p>
-            <a:pPr eaLnBrk="1" hangingPunct="1">
-              <a:lnSpc>
-                <a:spcPct val="80000"/>
-              </a:lnSpc>
-              <a:buNone/>
-            </a:pPr>
-            <a:r>
-              <a:rPr lang="en-US" sz="1800" dirty="0" smtClean="0">
-                <a:solidFill>
-                  <a:schemeClr val="bg1"/>
-                </a:solidFill>
-              </a:rPr>
-              <a:t>WWW: </a:t>
-            </a:r>
-            <a:r>
-              <a:rPr lang="en-US" sz="1800" dirty="0" smtClean="0">
-                <a:solidFill>
-                  <a:schemeClr val="bg1"/>
-                </a:solidFill>
-              </a:rPr>
-              <a:t/>
-            </a:r>
-            <a:br>
-              <a:rPr lang="en-US" sz="1800" dirty="0" smtClean="0">
-                <a:solidFill>
-                  <a:schemeClr val="bg1"/>
-                </a:solidFill>
-              </a:rPr>
-            </a:br>
-            <a:r>
-              <a:rPr lang="en-US" sz="1800" dirty="0" err="1" smtClean="0">
-                <a:solidFill>
-                  <a:schemeClr val="bg1"/>
-                </a:solidFill>
-              </a:rPr>
-              <a:t>mutedsolutions</a:t>
-            </a:r>
-            <a:r>
-              <a:rPr lang="en-US" sz="1800" dirty="0" err="1" smtClean="0">
-                <a:solidFill>
-                  <a:schemeClr val="bg1"/>
-                </a:solidFill>
-              </a:rPr>
-              <a:t>.com</a:t>
-            </a:r>
-            <a:r>
-              <a:rPr lang="en-US" sz="1800" dirty="0" smtClean="0">
-                <a:solidFill>
-                  <a:schemeClr val="bg1"/>
-                </a:solidFill>
-              </a:rPr>
-              <a:t/>
-            </a:r>
-            <a:br>
-              <a:rPr lang="en-US" sz="1800" dirty="0" smtClean="0">
-                <a:solidFill>
-                  <a:schemeClr val="bg1"/>
-                </a:solidFill>
-              </a:rPr>
-            </a:br>
-            <a:r>
-              <a:rPr lang="en-US" sz="1800" dirty="0" smtClean="0">
-                <a:solidFill>
-                  <a:schemeClr val="bg1"/>
-                </a:solidFill>
-              </a:rPr>
-              <a:t>derickbailey.lostechies.com</a:t>
-            </a:r>
-          </a:p>
-          <a:p>
-            <a:pPr eaLnBrk="1" hangingPunct="1">
-              <a:lnSpc>
-                <a:spcPct val="80000"/>
-              </a:lnSpc>
-              <a:buFont typeface="Arial" charset="0"/>
-              <a:buNone/>
-            </a:pPr>
-            <a:endParaRPr lang="en-US" sz="1800" dirty="0" smtClean="0">
-              <a:solidFill>
-                <a:schemeClr val="bg1"/>
-              </a:solidFill>
-            </a:endParaRPr>
-          </a:p>
-          <a:p>
-            <a:pPr eaLnBrk="1" hangingPunct="1">
-              <a:lnSpc>
-                <a:spcPct val="80000"/>
-              </a:lnSpc>
-              <a:buFont typeface="Arial" charset="0"/>
-              <a:buNone/>
-            </a:pPr>
-            <a:r>
-              <a:rPr lang="en-US" sz="1800" dirty="0" smtClean="0">
-                <a:solidFill>
-                  <a:schemeClr val="bg1"/>
-                </a:solidFill>
-              </a:rPr>
-              <a:t>Email: </a:t>
-            </a:r>
-            <a:br>
-              <a:rPr lang="en-US" sz="1800" dirty="0" smtClean="0">
-                <a:solidFill>
-                  <a:schemeClr val="bg1"/>
-                </a:solidFill>
-              </a:rPr>
-            </a:br>
-            <a:r>
-              <a:rPr lang="en-US" sz="1800" dirty="0" err="1" smtClean="0">
-                <a:solidFill>
-                  <a:schemeClr val="bg1"/>
-                </a:solidFill>
-              </a:rPr>
-              <a:t>derick@mutedsolutions.com</a:t>
-            </a:r>
-            <a:r>
-              <a:rPr lang="en-US" sz="1800" dirty="0" smtClean="0">
-                <a:solidFill>
-                  <a:schemeClr val="bg1"/>
-                </a:solidFill>
-              </a:rPr>
-              <a:t/>
-            </a:r>
-            <a:br>
-              <a:rPr lang="en-US" sz="1800" dirty="0" smtClean="0">
-                <a:solidFill>
-                  <a:schemeClr val="bg1"/>
-                </a:solidFill>
-              </a:rPr>
-            </a:br>
-            <a:r>
-              <a:rPr lang="en-US" sz="1800" dirty="0" smtClean="0">
-                <a:solidFill>
-                  <a:schemeClr val="bg1"/>
-                </a:solidFill>
-              </a:rPr>
-              <a:t>derick@derickbailey.com</a:t>
-            </a:r>
-          </a:p>
-          <a:p>
-            <a:pPr lvl="1" eaLnBrk="1" hangingPunct="1">
-              <a:lnSpc>
-                <a:spcPct val="80000"/>
-              </a:lnSpc>
-              <a:buFont typeface="Arial" charset="0"/>
-              <a:buNone/>
-            </a:pPr>
-            <a:endParaRPr lang="en-US" sz="1800" dirty="0" smtClean="0">
-              <a:solidFill>
-                <a:schemeClr val="bg1"/>
-              </a:solidFill>
-            </a:endParaRPr>
-          </a:p>
-          <a:p>
-            <a:pPr eaLnBrk="1" hangingPunct="1">
-              <a:lnSpc>
-                <a:spcPct val="80000"/>
-              </a:lnSpc>
-              <a:buFont typeface="Arial" charset="0"/>
-              <a:buNone/>
-            </a:pPr>
-            <a:r>
-              <a:rPr lang="en-US" sz="1800" dirty="0" smtClean="0">
-                <a:solidFill>
-                  <a:schemeClr val="bg1"/>
-                </a:solidFill>
-              </a:rPr>
-              <a:t>Twitter: </a:t>
-            </a:r>
-            <a:br>
-              <a:rPr lang="en-US" sz="1800" dirty="0" smtClean="0">
-                <a:solidFill>
-                  <a:schemeClr val="bg1"/>
-                </a:solidFill>
-              </a:rPr>
-            </a:br>
-            <a:r>
-              <a:rPr lang="en-US" sz="1800" dirty="0" smtClean="0">
-                <a:solidFill>
-                  <a:schemeClr val="bg1"/>
-                </a:solidFill>
-              </a:rPr>
-              <a:t>@</a:t>
-            </a:r>
-            <a:r>
-              <a:rPr lang="en-US" sz="1800" dirty="0" err="1" smtClean="0">
-                <a:solidFill>
-                  <a:schemeClr val="bg1"/>
-                </a:solidFill>
-              </a:rPr>
-              <a:t>derickbailey</a:t>
-            </a:r>
-            <a:endParaRPr lang="en-US" sz="1800" dirty="0" smtClean="0">
-              <a:solidFill>
-                <a:schemeClr val="bg1"/>
-              </a:solidFill>
+              <a:latin typeface="Calibri" pitchFamily="34" charset="0"/>
             </a:endParaRPr>
           </a:p>
         </p:txBody>
@@ -19490,7 +19471,7 @@
     </p:spTree>
     <p:extLst>
       <p:ext uri="{BB962C8B-B14F-4D97-AF65-F5344CB8AC3E}">
-        <p14:creationId xmlns:p14="http://schemas.microsoft.com/office/powerpoint/2010/main" val="3136420757"/>
+        <p14:creationId xmlns:p14="http://schemas.microsoft.com/office/powerpoint/2010/main" val="90861013"/>
       </p:ext>
     </p:extLst>
   </p:cSld>

</xml_diff>

<commit_message>
more notes for the slides
</commit_message>
<xml_diff>
--- a/SOLID Principles - Step By Step Code/SOLID Principles Presentation.pptx
+++ b/SOLID Principles - Step By Step Code/SOLID Principles Presentation.pptx
@@ -540,6 +540,17 @@
           <a:p>
             <a:r>
               <a:rPr lang="en-US" dirty="0" smtClean="0"/>
+              <a:t>OO is not about objects, directly. It’s about</a:t>
+            </a:r>
+            <a:r>
+              <a:rPr lang="en-US" baseline="0" dirty="0" smtClean="0"/>
+              <a:t> solving problems through models</a:t>
+            </a:r>
+            <a:endParaRPr lang="en-US" dirty="0" smtClean="0"/>
+          </a:p>
+          <a:p>
+            <a:r>
+              <a:rPr lang="en-US" dirty="0" smtClean="0"/>
               <a:t>OO is about</a:t>
             </a:r>
             <a:r>
@@ -552,7 +563,6 @@
               <a:rPr lang="en-US" baseline="0" dirty="0" smtClean="0"/>
               <a:t>If you can’t correctly use your objects in the app they were built for, for the initial reason they were built, you have zero chance of ever re-using them successfully</a:t>
             </a:r>
-            <a:endParaRPr lang="en-US" dirty="0"/>
           </a:p>
         </p:txBody>
       </p:sp>
@@ -2948,6 +2958,33 @@
               <a:rPr lang="en-US" dirty="0" smtClean="0"/>
               <a:t>SOLID helps us get to the lofty goals of the OO principles</a:t>
             </a:r>
+          </a:p>
+          <a:p>
+            <a:r>
+              <a:rPr lang="en-US" dirty="0" smtClean="0"/>
+              <a:t>They give us a way to manage the dependencies in our app, which helps</a:t>
+            </a:r>
+            <a:r>
+              <a:rPr lang="en-US" baseline="0" dirty="0" smtClean="0"/>
+              <a:t> us create good </a:t>
+            </a:r>
+            <a:r>
+              <a:rPr lang="en-US" baseline="0" smtClean="0"/>
+              <a:t>OO software</a:t>
+            </a:r>
+            <a:endParaRPr lang="en-US" smtClean="0"/>
+          </a:p>
+          <a:p>
+            <a:r>
+              <a:rPr lang="en-US" dirty="0" smtClean="0"/>
+              <a:t>But these are just principles, not laws. They have a context</a:t>
+            </a:r>
+            <a:r>
+              <a:rPr lang="en-US" baseline="0" dirty="0" smtClean="0"/>
+              <a:t> in which they apply, and there are times when they are not needed or they are applied differently</a:t>
+            </a:r>
+          </a:p>
+          <a:p>
             <a:endParaRPr lang="en-US" dirty="0"/>
           </a:p>
         </p:txBody>

</xml_diff>